<commit_message>
Add seek images from decimated 206 camera Fix hardcoded srFactor parameter in main.cpp Add run-seek-2x.bat Add run-eia-2x.bat Add run-text-2x.bat
</commit_message>
<xml_diff>
--- a/doc/SuperRes.pptx
+++ b/doc/SuperRes.pptx
@@ -5,7 +5,7 @@
     <p:sldMasterId id="2147483751" r:id="rId1"/>
   </p:sldMasterIdLst>
   <p:handoutMasterIdLst>
-    <p:handoutMasterId r:id="rId8"/>
+    <p:handoutMasterId r:id="rId10"/>
   </p:handoutMasterIdLst>
   <p:sldIdLst>
     <p:sldId id="256" r:id="rId2"/>
@@ -14,6 +14,8 @@
     <p:sldId id="260" r:id="rId5"/>
     <p:sldId id="259" r:id="rId6"/>
     <p:sldId id="261" r:id="rId7"/>
+    <p:sldId id="262" r:id="rId8"/>
+    <p:sldId id="263" r:id="rId9"/>
   </p:sldIdLst>
   <p:sldSz cx="12192000" cy="6858000"/>
   <p:notesSz cx="7772400" cy="10058400"/>
@@ -217,7 +219,7 @@
           <a:p>
             <a:fld id="{A8FEA5F6-C128-7D42-B852-EE0BD41289E6}" type="datetimeFigureOut">
               <a:rPr lang="en-US" smtClean="0"/>
-              <a:t>4/23/2020</a:t>
+              <a:t>4/27/2020</a:t>
             </a:fld>
             <a:endParaRPr lang="en-US"/>
           </a:p>
@@ -441,7 +443,7 @@
           <a:p>
             <a:fld id="{03C079E3-F3AF-45D0-80C9-F1EB5ACFF5C6}" type="datetime1">
               <a:rPr lang="en-US" smtClean="0"/>
-              <a:t>4/23/2020</a:t>
+              <a:t>4/27/2020</a:t>
             </a:fld>
             <a:endParaRPr lang="en-US"/>
           </a:p>
@@ -612,7 +614,7 @@
           <a:p>
             <a:fld id="{CC580D91-220E-4CA3-A5A8-D04CB5698DFE}" type="datetime1">
               <a:rPr lang="en-US" smtClean="0"/>
-              <a:t>4/23/2020</a:t>
+              <a:t>4/27/2020</a:t>
             </a:fld>
             <a:endParaRPr lang="en-US"/>
           </a:p>
@@ -793,7 +795,7 @@
           <a:p>
             <a:fld id="{BC5A4BEE-9B9B-44F9-804F-F2415DB37DB3}" type="datetime1">
               <a:rPr lang="en-US" smtClean="0"/>
-              <a:t>4/23/2020</a:t>
+              <a:t>4/27/2020</a:t>
             </a:fld>
             <a:endParaRPr lang="en-US"/>
           </a:p>
@@ -1303,7 +1305,7 @@
           <a:p>
             <a:fld id="{18F8BBFA-4311-4F0D-9EFA-A17F07365DE1}" type="datetime1">
               <a:rPr lang="en-US" smtClean="0"/>
-              <a:t>4/23/2020</a:t>
+              <a:t>4/27/2020</a:t>
             </a:fld>
             <a:endParaRPr lang="en-US"/>
           </a:p>
@@ -1642,7 +1644,7 @@
             <a:fld id="{CBFB9B72-5D09-4F82-BD9B-A3EC267EC6B2}" type="datetime1">
               <a:rPr lang="en-US" smtClean="0"/>
               <a:pPr/>
-              <a:t>4/23/2020</a:t>
+              <a:t>4/27/2020</a:t>
             </a:fld>
             <a:endParaRPr lang="en-US" dirty="0"/>
           </a:p>
@@ -1887,7 +1889,7 @@
           <a:p>
             <a:fld id="{ADAD34AE-F053-446E-9718-F3B6BF5290BC}" type="datetime1">
               <a:rPr lang="en-US" smtClean="0"/>
-              <a:t>4/23/2020</a:t>
+              <a:t>4/27/2020</a:t>
             </a:fld>
             <a:endParaRPr lang="en-US"/>
           </a:p>
@@ -2254,7 +2256,7 @@
           <a:p>
             <a:fld id="{FE7BB467-F74C-4B6E-A1B0-296B85EC07C0}" type="datetime1">
               <a:rPr lang="en-US" smtClean="0"/>
-              <a:t>4/23/2020</a:t>
+              <a:t>4/27/2020</a:t>
             </a:fld>
             <a:endParaRPr lang="en-US"/>
           </a:p>
@@ -2374,7 +2376,7 @@
           <a:p>
             <a:fld id="{9E7C8656-70E0-4BB2-86A7-DAADC775AECB}" type="datetime1">
               <a:rPr lang="en-US" smtClean="0"/>
-              <a:t>4/23/2020</a:t>
+              <a:t>4/27/2020</a:t>
             </a:fld>
             <a:endParaRPr lang="en-US"/>
           </a:p>
@@ -2472,7 +2474,7 @@
           <a:p>
             <a:fld id="{E2DFE557-B6FA-4EE9-9A24-EC76EA5D11A5}" type="datetime1">
               <a:rPr lang="en-US" smtClean="0"/>
-              <a:t>4/23/2020</a:t>
+              <a:t>4/27/2020</a:t>
             </a:fld>
             <a:endParaRPr lang="en-US"/>
           </a:p>
@@ -2750,7 +2752,7 @@
           <a:p>
             <a:fld id="{979A59E5-C72B-483A-973E-297CB30D810B}" type="datetime1">
               <a:rPr lang="en-US" smtClean="0"/>
-              <a:t>4/23/2020</a:t>
+              <a:t>4/27/2020</a:t>
             </a:fld>
             <a:endParaRPr lang="en-US"/>
           </a:p>
@@ -3008,7 +3010,7 @@
           <a:p>
             <a:fld id="{BC0D42AD-88D3-4D4A-AF19-2669679066E6}" type="datetime1">
               <a:rPr lang="en-US" smtClean="0"/>
-              <a:t>4/23/2020</a:t>
+              <a:t>4/27/2020</a:t>
             </a:fld>
             <a:endParaRPr lang="en-US"/>
           </a:p>
@@ -3223,7 +3225,7 @@
             <a:fld id="{CBFB9B72-5D09-4F82-BD9B-A3EC267EC6B2}" type="datetime1">
               <a:rPr lang="en-US" smtClean="0"/>
               <a:pPr/>
-              <a:t>4/23/2020</a:t>
+              <a:t>4/27/2020</a:t>
             </a:fld>
             <a:endParaRPr lang="en-US" dirty="0"/>
           </a:p>
@@ -5182,12 +5184,132 @@
           </a:p>
         </p:txBody>
       </p:sp>
+      <p:sp>
+        <p:nvSpPr>
+          <p:cNvPr id="24" name="TextBox 23">
+            <a:extLst>
+              <a:ext uri="{FF2B5EF4-FFF2-40B4-BE49-F238E27FC236}">
+                <a16:creationId xmlns:a16="http://schemas.microsoft.com/office/drawing/2014/main" id="{FB9A142D-2C1D-4D75-975D-69E491C04A32}"/>
+              </a:ext>
+            </a:extLst>
+          </p:cNvPr>
+          <p:cNvSpPr txBox="1"/>
+          <p:nvPr/>
+        </p:nvSpPr>
+        <p:spPr>
+          <a:xfrm flipH="1">
+            <a:off x="4410484" y="5381974"/>
+            <a:ext cx="3305175" cy="461665"/>
+          </a:xfrm>
+          <a:prstGeom prst="rect">
+            <a:avLst/>
+          </a:prstGeom>
+          <a:noFill/>
+        </p:spPr>
+        <p:txBody>
+          <a:bodyPr wrap="square" rtlCol="0">
+            <a:spAutoFit/>
+          </a:bodyPr>
+          <a:lstStyle/>
+          <a:p>
+            <a:pPr algn="ctr"/>
+            <a:r>
+              <a:rPr lang="en-US" dirty="0"/>
+              <a:t>Images </a:t>
+            </a:r>
+            <a:r>
+              <a:rPr lang="en-US" sz="2400" dirty="0"/>
+              <a:t>0-7</a:t>
+            </a:r>
+          </a:p>
+        </p:txBody>
+      </p:sp>
+      <p:sp>
+        <p:nvSpPr>
+          <p:cNvPr id="36" name="TextBox 35">
+            <a:extLst>
+              <a:ext uri="{FF2B5EF4-FFF2-40B4-BE49-F238E27FC236}">
+                <a16:creationId xmlns:a16="http://schemas.microsoft.com/office/drawing/2014/main" id="{93D22001-BBE4-493C-AEE6-6B93CA4DA7D9}"/>
+              </a:ext>
+            </a:extLst>
+          </p:cNvPr>
+          <p:cNvSpPr txBox="1"/>
+          <p:nvPr/>
+        </p:nvSpPr>
+        <p:spPr>
+          <a:xfrm flipH="1">
+            <a:off x="8388692" y="5381975"/>
+            <a:ext cx="3305175" cy="461665"/>
+          </a:xfrm>
+          <a:prstGeom prst="rect">
+            <a:avLst/>
+          </a:prstGeom>
+          <a:noFill/>
+        </p:spPr>
+        <p:txBody>
+          <a:bodyPr wrap="square" rtlCol="0">
+            <a:spAutoFit/>
+          </a:bodyPr>
+          <a:lstStyle/>
+          <a:p>
+            <a:pPr algn="ctr"/>
+            <a:r>
+              <a:rPr lang="en-US" dirty="0"/>
+              <a:t>Images </a:t>
+            </a:r>
+            <a:r>
+              <a:rPr lang="en-US" sz="2400" dirty="0"/>
+              <a:t>8-15</a:t>
+            </a:r>
+          </a:p>
+        </p:txBody>
+      </p:sp>
+      <p:sp>
+        <p:nvSpPr>
+          <p:cNvPr id="39" name="TextBox 38">
+            <a:extLst>
+              <a:ext uri="{FF2B5EF4-FFF2-40B4-BE49-F238E27FC236}">
+                <a16:creationId xmlns:a16="http://schemas.microsoft.com/office/drawing/2014/main" id="{6ACBE7E4-10B5-49B7-8868-8C6CD4053283}"/>
+              </a:ext>
+            </a:extLst>
+          </p:cNvPr>
+          <p:cNvSpPr txBox="1"/>
+          <p:nvPr/>
+        </p:nvSpPr>
+        <p:spPr>
+          <a:xfrm flipH="1">
+            <a:off x="700350" y="5378479"/>
+            <a:ext cx="3305175" cy="461665"/>
+          </a:xfrm>
+          <a:prstGeom prst="rect">
+            <a:avLst/>
+          </a:prstGeom>
+          <a:noFill/>
+        </p:spPr>
+        <p:txBody>
+          <a:bodyPr wrap="square" rtlCol="0">
+            <a:spAutoFit/>
+          </a:bodyPr>
+          <a:lstStyle/>
+          <a:p>
+            <a:pPr algn="ctr"/>
+            <a:r>
+              <a:rPr lang="en-US" dirty="0"/>
+              <a:t>Images </a:t>
+            </a:r>
+            <a:r>
+              <a:rPr lang="en-US" sz="2400" dirty="0"/>
+              <a:t>0-15</a:t>
+            </a:r>
+          </a:p>
+        </p:txBody>
+      </p:sp>
       <p:pic>
         <p:nvPicPr>
-          <p:cNvPr id="12" name="Picture 11" descr="A picture containing building, bicycle, white&#10;&#10;Description automatically generated">
+          <p:cNvPr id="6" name="Picture 5" descr="A picture containing clock&#10;&#10;Description automatically generated">
             <a:extLst>
               <a:ext uri="{FF2B5EF4-FFF2-40B4-BE49-F238E27FC236}">
-                <a16:creationId xmlns:a16="http://schemas.microsoft.com/office/drawing/2014/main" id="{C1ED5237-FAE3-4385-8D1B-8AFBB2B93947}"/>
+                <a16:creationId xmlns:a16="http://schemas.microsoft.com/office/drawing/2014/main" id="{440B266E-0A10-4A6F-BB30-D4BB5F727814}"/>
               </a:ext>
             </a:extLst>
           </p:cNvPr>
@@ -5210,8 +5332,8 @@
         </p:blipFill>
         <p:spPr>
           <a:xfrm>
-            <a:off x="4410485" y="2076802"/>
-            <a:ext cx="3305175" cy="3305175"/>
+            <a:off x="827269" y="2049558"/>
+            <a:ext cx="3295650" cy="3295650"/>
           </a:xfrm>
           <a:prstGeom prst="rect">
             <a:avLst/>
@@ -5220,10 +5342,10 @@
       </p:pic>
       <p:pic>
         <p:nvPicPr>
-          <p:cNvPr id="16" name="Picture 15" descr="A picture containing building, light, white, air&#10;&#10;Description automatically generated">
+          <p:cNvPr id="8" name="Picture 7" descr="A close up of a logo&#10;&#10;Description automatically generated">
             <a:extLst>
               <a:ext uri="{FF2B5EF4-FFF2-40B4-BE49-F238E27FC236}">
-                <a16:creationId xmlns:a16="http://schemas.microsoft.com/office/drawing/2014/main" id="{4E4D49AB-28A8-495E-BF9C-AFDE38422F08}"/>
+                <a16:creationId xmlns:a16="http://schemas.microsoft.com/office/drawing/2014/main" id="{E29030E5-4503-4A11-ABFF-A63B48224497}"/>
               </a:ext>
             </a:extLst>
           </p:cNvPr>
@@ -5246,8 +5368,8 @@
         </p:blipFill>
         <p:spPr>
           <a:xfrm>
-            <a:off x="8388692" y="2076801"/>
-            <a:ext cx="3305175" cy="3305175"/>
+            <a:off x="4655396" y="2009671"/>
+            <a:ext cx="3295650" cy="3295650"/>
           </a:xfrm>
           <a:prstGeom prst="rect">
             <a:avLst/>
@@ -5256,10 +5378,10 @@
       </p:pic>
       <p:pic>
         <p:nvPicPr>
-          <p:cNvPr id="20" name="Picture 19" descr="A close up of a sign&#10;&#10;Description automatically generated">
+          <p:cNvPr id="10" name="Picture 9" descr="A picture containing clock&#10;&#10;Description automatically generated">
             <a:extLst>
               <a:ext uri="{FF2B5EF4-FFF2-40B4-BE49-F238E27FC236}">
-                <a16:creationId xmlns:a16="http://schemas.microsoft.com/office/drawing/2014/main" id="{7DA31CEF-5597-484E-8961-E7D3ECCB84AE}"/>
+                <a16:creationId xmlns:a16="http://schemas.microsoft.com/office/drawing/2014/main" id="{1FE26D49-B57E-4990-8DFB-A1AD239E1343}"/>
               </a:ext>
             </a:extLst>
           </p:cNvPr>
@@ -5282,134 +5404,14 @@
         </p:blipFill>
         <p:spPr>
           <a:xfrm>
-            <a:off x="700351" y="2076800"/>
-            <a:ext cx="3305175" cy="3305175"/>
+            <a:off x="8524019" y="2009663"/>
+            <a:ext cx="3295650" cy="3295650"/>
           </a:xfrm>
           <a:prstGeom prst="rect">
             <a:avLst/>
           </a:prstGeom>
         </p:spPr>
       </p:pic>
-      <p:sp>
-        <p:nvSpPr>
-          <p:cNvPr id="24" name="TextBox 23">
-            <a:extLst>
-              <a:ext uri="{FF2B5EF4-FFF2-40B4-BE49-F238E27FC236}">
-                <a16:creationId xmlns:a16="http://schemas.microsoft.com/office/drawing/2014/main" id="{FB9A142D-2C1D-4D75-975D-69E491C04A32}"/>
-              </a:ext>
-            </a:extLst>
-          </p:cNvPr>
-          <p:cNvSpPr txBox="1"/>
-          <p:nvPr/>
-        </p:nvSpPr>
-        <p:spPr>
-          <a:xfrm flipH="1">
-            <a:off x="4410484" y="5381974"/>
-            <a:ext cx="3305175" cy="461665"/>
-          </a:xfrm>
-          <a:prstGeom prst="rect">
-            <a:avLst/>
-          </a:prstGeom>
-          <a:noFill/>
-        </p:spPr>
-        <p:txBody>
-          <a:bodyPr wrap="square" rtlCol="0">
-            <a:spAutoFit/>
-          </a:bodyPr>
-          <a:lstStyle/>
-          <a:p>
-            <a:pPr algn="ctr"/>
-            <a:r>
-              <a:rPr lang="en-US" dirty="0"/>
-              <a:t>Images </a:t>
-            </a:r>
-            <a:r>
-              <a:rPr lang="en-US" sz="2400" dirty="0"/>
-              <a:t>0-7</a:t>
-            </a:r>
-          </a:p>
-        </p:txBody>
-      </p:sp>
-      <p:sp>
-        <p:nvSpPr>
-          <p:cNvPr id="36" name="TextBox 35">
-            <a:extLst>
-              <a:ext uri="{FF2B5EF4-FFF2-40B4-BE49-F238E27FC236}">
-                <a16:creationId xmlns:a16="http://schemas.microsoft.com/office/drawing/2014/main" id="{93D22001-BBE4-493C-AEE6-6B93CA4DA7D9}"/>
-              </a:ext>
-            </a:extLst>
-          </p:cNvPr>
-          <p:cNvSpPr txBox="1"/>
-          <p:nvPr/>
-        </p:nvSpPr>
-        <p:spPr>
-          <a:xfrm flipH="1">
-            <a:off x="8388692" y="5381975"/>
-            <a:ext cx="3305175" cy="461665"/>
-          </a:xfrm>
-          <a:prstGeom prst="rect">
-            <a:avLst/>
-          </a:prstGeom>
-          <a:noFill/>
-        </p:spPr>
-        <p:txBody>
-          <a:bodyPr wrap="square" rtlCol="0">
-            <a:spAutoFit/>
-          </a:bodyPr>
-          <a:lstStyle/>
-          <a:p>
-            <a:pPr algn="ctr"/>
-            <a:r>
-              <a:rPr lang="en-US" dirty="0"/>
-              <a:t>Images </a:t>
-            </a:r>
-            <a:r>
-              <a:rPr lang="en-US" sz="2400" dirty="0"/>
-              <a:t>8-15</a:t>
-            </a:r>
-          </a:p>
-        </p:txBody>
-      </p:sp>
-      <p:sp>
-        <p:nvSpPr>
-          <p:cNvPr id="39" name="TextBox 38">
-            <a:extLst>
-              <a:ext uri="{FF2B5EF4-FFF2-40B4-BE49-F238E27FC236}">
-                <a16:creationId xmlns:a16="http://schemas.microsoft.com/office/drawing/2014/main" id="{6ACBE7E4-10B5-49B7-8868-8C6CD4053283}"/>
-              </a:ext>
-            </a:extLst>
-          </p:cNvPr>
-          <p:cNvSpPr txBox="1"/>
-          <p:nvPr/>
-        </p:nvSpPr>
-        <p:spPr>
-          <a:xfrm flipH="1">
-            <a:off x="700350" y="5378479"/>
-            <a:ext cx="3305175" cy="461665"/>
-          </a:xfrm>
-          <a:prstGeom prst="rect">
-            <a:avLst/>
-          </a:prstGeom>
-          <a:noFill/>
-        </p:spPr>
-        <p:txBody>
-          <a:bodyPr wrap="square" rtlCol="0">
-            <a:spAutoFit/>
-          </a:bodyPr>
-          <a:lstStyle/>
-          <a:p>
-            <a:pPr algn="ctr"/>
-            <a:r>
-              <a:rPr lang="en-US" dirty="0"/>
-              <a:t>Images </a:t>
-            </a:r>
-            <a:r>
-              <a:rPr lang="en-US" sz="2400" dirty="0"/>
-              <a:t>0-15</a:t>
-            </a:r>
-          </a:p>
-        </p:txBody>
-      </p:sp>
     </p:spTree>
     <p:extLst>
       <p:ext uri="{BB962C8B-B14F-4D97-AF65-F5344CB8AC3E}">
@@ -6841,12 +6843,120 @@
           </a:p>
         </p:txBody>
       </p:sp>
+      <p:sp>
+        <p:nvSpPr>
+          <p:cNvPr id="46" name="TextBox 45">
+            <a:extLst>
+              <a:ext uri="{FF2B5EF4-FFF2-40B4-BE49-F238E27FC236}">
+                <a16:creationId xmlns:a16="http://schemas.microsoft.com/office/drawing/2014/main" id="{1A92B6AA-4755-4285-9CC7-9A41216AD3D6}"/>
+              </a:ext>
+            </a:extLst>
+          </p:cNvPr>
+          <p:cNvSpPr txBox="1"/>
+          <p:nvPr/>
+        </p:nvSpPr>
+        <p:spPr>
+          <a:xfrm flipH="1">
+            <a:off x="1698483" y="4452933"/>
+            <a:ext cx="1777437" cy="461665"/>
+          </a:xfrm>
+          <a:prstGeom prst="rect">
+            <a:avLst/>
+          </a:prstGeom>
+          <a:noFill/>
+        </p:spPr>
+        <p:txBody>
+          <a:bodyPr wrap="square" rtlCol="0">
+            <a:spAutoFit/>
+          </a:bodyPr>
+          <a:lstStyle/>
+          <a:p>
+            <a:pPr algn="ctr"/>
+            <a:r>
+              <a:rPr lang="en-US" sz="2400" dirty="0"/>
+              <a:t>Images 0-30</a:t>
+            </a:r>
+          </a:p>
+        </p:txBody>
+      </p:sp>
+      <p:sp>
+        <p:nvSpPr>
+          <p:cNvPr id="48" name="TextBox 47">
+            <a:extLst>
+              <a:ext uri="{FF2B5EF4-FFF2-40B4-BE49-F238E27FC236}">
+                <a16:creationId xmlns:a16="http://schemas.microsoft.com/office/drawing/2014/main" id="{F3675411-A53F-4ECC-AD51-AFCEAB73300D}"/>
+              </a:ext>
+            </a:extLst>
+          </p:cNvPr>
+          <p:cNvSpPr txBox="1"/>
+          <p:nvPr/>
+        </p:nvSpPr>
+        <p:spPr>
+          <a:xfrm flipH="1">
+            <a:off x="5353948" y="4452932"/>
+            <a:ext cx="1777437" cy="461665"/>
+          </a:xfrm>
+          <a:prstGeom prst="rect">
+            <a:avLst/>
+          </a:prstGeom>
+          <a:noFill/>
+        </p:spPr>
+        <p:txBody>
+          <a:bodyPr wrap="square" rtlCol="0">
+            <a:spAutoFit/>
+          </a:bodyPr>
+          <a:lstStyle/>
+          <a:p>
+            <a:pPr algn="ctr"/>
+            <a:r>
+              <a:rPr lang="en-US" sz="2400" dirty="0"/>
+              <a:t>Images 0-14</a:t>
+            </a:r>
+          </a:p>
+        </p:txBody>
+      </p:sp>
+      <p:sp>
+        <p:nvSpPr>
+          <p:cNvPr id="49" name="TextBox 48">
+            <a:extLst>
+              <a:ext uri="{FF2B5EF4-FFF2-40B4-BE49-F238E27FC236}">
+                <a16:creationId xmlns:a16="http://schemas.microsoft.com/office/drawing/2014/main" id="{ED5165BB-DD52-49AC-BF4A-F4A09D02F71B}"/>
+              </a:ext>
+            </a:extLst>
+          </p:cNvPr>
+          <p:cNvSpPr txBox="1"/>
+          <p:nvPr/>
+        </p:nvSpPr>
+        <p:spPr>
+          <a:xfrm flipH="1">
+            <a:off x="8568839" y="4370744"/>
+            <a:ext cx="2034090" cy="461665"/>
+          </a:xfrm>
+          <a:prstGeom prst="rect">
+            <a:avLst/>
+          </a:prstGeom>
+          <a:noFill/>
+        </p:spPr>
+        <p:txBody>
+          <a:bodyPr wrap="square" rtlCol="0">
+            <a:spAutoFit/>
+          </a:bodyPr>
+          <a:lstStyle/>
+          <a:p>
+            <a:pPr algn="ctr"/>
+            <a:r>
+              <a:rPr lang="en-US" sz="2400" dirty="0"/>
+              <a:t>Images 15-30</a:t>
+            </a:r>
+          </a:p>
+        </p:txBody>
+      </p:sp>
       <p:pic>
         <p:nvPicPr>
-          <p:cNvPr id="39" name="Picture 38" descr="A sign on the side of a building&#10;&#10;Description automatically generated">
+          <p:cNvPr id="6" name="Picture 5" descr="A picture containing white, sitting, holding, ball&#10;&#10;Description automatically generated">
             <a:extLst>
               <a:ext uri="{FF2B5EF4-FFF2-40B4-BE49-F238E27FC236}">
-                <a16:creationId xmlns:a16="http://schemas.microsoft.com/office/drawing/2014/main" id="{B7332F20-D0AC-4FD5-8BE8-BE1E449D2A4E}"/>
+                <a16:creationId xmlns:a16="http://schemas.microsoft.com/office/drawing/2014/main" id="{9A863B2E-BB08-46C2-B778-A0DC86CE3181}"/>
               </a:ext>
             </a:extLst>
           </p:cNvPr>
@@ -6869,8 +6979,8 @@
         </p:blipFill>
         <p:spPr>
           <a:xfrm>
-            <a:off x="5388310" y="2405058"/>
-            <a:ext cx="1743075" cy="2047875"/>
+            <a:off x="1728567" y="2334611"/>
+            <a:ext cx="1733550" cy="2038350"/>
           </a:xfrm>
           <a:prstGeom prst="rect">
             <a:avLst/>
@@ -6879,10 +6989,10 @@
       </p:pic>
       <p:pic>
         <p:nvPicPr>
-          <p:cNvPr id="7" name="Picture 6" descr="A close up of text on a black background&#10;&#10;Description automatically generated">
+          <p:cNvPr id="9" name="Picture 8" descr="A picture containing sitting, white, black, holding&#10;&#10;Description automatically generated">
             <a:extLst>
               <a:ext uri="{FF2B5EF4-FFF2-40B4-BE49-F238E27FC236}">
-                <a16:creationId xmlns:a16="http://schemas.microsoft.com/office/drawing/2014/main" id="{287C8241-B732-4BDF-8B04-DCD31B318B27}"/>
+                <a16:creationId xmlns:a16="http://schemas.microsoft.com/office/drawing/2014/main" id="{5BDA952C-F694-4094-AEC3-0F573036AD3B}"/>
               </a:ext>
             </a:extLst>
           </p:cNvPr>
@@ -6905,8 +7015,8 @@
         </p:blipFill>
         <p:spPr>
           <a:xfrm>
-            <a:off x="8716080" y="2322869"/>
-            <a:ext cx="1743075" cy="2047875"/>
+            <a:off x="5409942" y="2352110"/>
+            <a:ext cx="1733550" cy="2038350"/>
           </a:xfrm>
           <a:prstGeom prst="rect">
             <a:avLst/>
@@ -6915,10 +7025,10 @@
       </p:pic>
       <p:pic>
         <p:nvPicPr>
-          <p:cNvPr id="10" name="Picture 9" descr="A close up of text on a black background&#10;&#10;Description automatically generated">
+          <p:cNvPr id="12" name="Picture 11" descr="A picture containing sitting, white, holding, meter&#10;&#10;Description automatically generated">
             <a:extLst>
               <a:ext uri="{FF2B5EF4-FFF2-40B4-BE49-F238E27FC236}">
-                <a16:creationId xmlns:a16="http://schemas.microsoft.com/office/drawing/2014/main" id="{B194D52F-8958-4B9E-ACFD-0B8BBF4EDCC8}"/>
+                <a16:creationId xmlns:a16="http://schemas.microsoft.com/office/drawing/2014/main" id="{80347C5E-0DCD-4CCB-B8C7-06EE8E3B1092}"/>
               </a:ext>
             </a:extLst>
           </p:cNvPr>
@@ -6928,7 +7038,7 @@
           <p:nvPr/>
         </p:nvPicPr>
         <p:blipFill>
-          <a:blip r:embed="rId3">
+          <a:blip r:embed="rId4">
             <a:extLst>
               <a:ext uri="{28A0092B-C50C-407E-A947-70E740481C1C}">
                 <a14:useLocalDpi xmlns:a14="http://schemas.microsoft.com/office/drawing/2010/main" val="0"/>
@@ -6941,126 +7051,1862 @@
         </p:blipFill>
         <p:spPr>
           <a:xfrm>
-            <a:off x="1732846" y="2405062"/>
-            <a:ext cx="1743075" cy="2047875"/>
+            <a:off x="8727183" y="2334610"/>
+            <a:ext cx="1733550" cy="2038350"/>
           </a:xfrm>
           <a:prstGeom prst="rect">
             <a:avLst/>
           </a:prstGeom>
         </p:spPr>
       </p:pic>
-      <p:sp>
-        <p:nvSpPr>
-          <p:cNvPr id="46" name="TextBox 45">
-            <a:extLst>
-              <a:ext uri="{FF2B5EF4-FFF2-40B4-BE49-F238E27FC236}">
-                <a16:creationId xmlns:a16="http://schemas.microsoft.com/office/drawing/2014/main" id="{1A92B6AA-4755-4285-9CC7-9A41216AD3D6}"/>
-              </a:ext>
-            </a:extLst>
-          </p:cNvPr>
-          <p:cNvSpPr txBox="1"/>
-          <p:nvPr/>
-        </p:nvSpPr>
-        <p:spPr>
-          <a:xfrm flipH="1">
-            <a:off x="1698483" y="4452933"/>
-            <a:ext cx="1777437" cy="461665"/>
-          </a:xfrm>
-          <a:prstGeom prst="rect">
-            <a:avLst/>
-          </a:prstGeom>
-          <a:noFill/>
-        </p:spPr>
-        <p:txBody>
-          <a:bodyPr wrap="square" rtlCol="0">
-            <a:spAutoFit/>
-          </a:bodyPr>
-          <a:lstStyle/>
-          <a:p>
-            <a:pPr algn="ctr"/>
-            <a:r>
-              <a:rPr lang="en-US" sz="2400" dirty="0"/>
-              <a:t>Images 0-30</a:t>
-            </a:r>
-          </a:p>
-        </p:txBody>
-      </p:sp>
-      <p:sp>
-        <p:nvSpPr>
-          <p:cNvPr id="48" name="TextBox 47">
-            <a:extLst>
-              <a:ext uri="{FF2B5EF4-FFF2-40B4-BE49-F238E27FC236}">
-                <a16:creationId xmlns:a16="http://schemas.microsoft.com/office/drawing/2014/main" id="{F3675411-A53F-4ECC-AD51-AFCEAB73300D}"/>
-              </a:ext>
-            </a:extLst>
-          </p:cNvPr>
-          <p:cNvSpPr txBox="1"/>
-          <p:nvPr/>
-        </p:nvSpPr>
-        <p:spPr>
-          <a:xfrm flipH="1">
-            <a:off x="5353948" y="4452932"/>
-            <a:ext cx="1777437" cy="461665"/>
-          </a:xfrm>
-          <a:prstGeom prst="rect">
-            <a:avLst/>
-          </a:prstGeom>
-          <a:noFill/>
-        </p:spPr>
-        <p:txBody>
-          <a:bodyPr wrap="square" rtlCol="0">
-            <a:spAutoFit/>
-          </a:bodyPr>
-          <a:lstStyle/>
-          <a:p>
-            <a:pPr algn="ctr"/>
-            <a:r>
-              <a:rPr lang="en-US" sz="2400" dirty="0"/>
-              <a:t>Images 0-14</a:t>
-            </a:r>
-          </a:p>
-        </p:txBody>
-      </p:sp>
-      <p:sp>
-        <p:nvSpPr>
-          <p:cNvPr id="49" name="TextBox 48">
-            <a:extLst>
-              <a:ext uri="{FF2B5EF4-FFF2-40B4-BE49-F238E27FC236}">
-                <a16:creationId xmlns:a16="http://schemas.microsoft.com/office/drawing/2014/main" id="{ED5165BB-DD52-49AC-BF4A-F4A09D02F71B}"/>
-              </a:ext>
-            </a:extLst>
-          </p:cNvPr>
-          <p:cNvSpPr txBox="1"/>
-          <p:nvPr/>
-        </p:nvSpPr>
-        <p:spPr>
-          <a:xfrm flipH="1">
-            <a:off x="8568839" y="4370744"/>
-            <a:ext cx="2034090" cy="461665"/>
-          </a:xfrm>
-          <a:prstGeom prst="rect">
-            <a:avLst/>
-          </a:prstGeom>
-          <a:noFill/>
-        </p:spPr>
-        <p:txBody>
-          <a:bodyPr wrap="square" rtlCol="0">
-            <a:spAutoFit/>
-          </a:bodyPr>
-          <a:lstStyle/>
-          <a:p>
-            <a:pPr algn="ctr"/>
-            <a:r>
-              <a:rPr lang="en-US" sz="2400" dirty="0"/>
-              <a:t>Images 15-30</a:t>
-            </a:r>
-          </a:p>
-        </p:txBody>
-      </p:sp>
     </p:spTree>
     <p:extLst>
       <p:ext uri="{BB962C8B-B14F-4D97-AF65-F5344CB8AC3E}">
         <p14:creationId xmlns:p14="http://schemas.microsoft.com/office/powerpoint/2010/main" val="2106831816"/>
+      </p:ext>
+    </p:extLst>
+  </p:cSld>
+  <p:clrMapOvr>
+    <a:masterClrMapping/>
+  </p:clrMapOvr>
+</p:sld>
+</file>
+
+<file path=ppt/slides/slide7.xml><?xml version="1.0" encoding="utf-8"?>
+<p:sld xmlns:a="http://schemas.openxmlformats.org/drawingml/2006/main" xmlns:r="http://schemas.openxmlformats.org/officeDocument/2006/relationships" xmlns:p="http://schemas.openxmlformats.org/presentationml/2006/main">
+  <p:cSld>
+    <p:spTree>
+      <p:nvGrpSpPr>
+        <p:cNvPr id="1" name=""/>
+        <p:cNvGrpSpPr/>
+        <p:nvPr/>
+      </p:nvGrpSpPr>
+      <p:grpSpPr>
+        <a:xfrm>
+          <a:off x="0" y="0"/>
+          <a:ext cx="0" cy="0"/>
+          <a:chOff x="0" y="0"/>
+          <a:chExt cx="0" cy="0"/>
+        </a:xfrm>
+      </p:grpSpPr>
+      <p:sp>
+        <p:nvSpPr>
+          <p:cNvPr id="4" name="Title 3">
+            <a:extLst>
+              <a:ext uri="{FF2B5EF4-FFF2-40B4-BE49-F238E27FC236}">
+                <a16:creationId xmlns:a16="http://schemas.microsoft.com/office/drawing/2014/main" id="{4714037B-6792-46D1-B1A3-8F9D22F05587}"/>
+              </a:ext>
+            </a:extLst>
+          </p:cNvPr>
+          <p:cNvSpPr>
+            <a:spLocks noGrp="1"/>
+          </p:cNvSpPr>
+          <p:nvPr>
+            <p:ph type="title"/>
+          </p:nvPr>
+        </p:nvSpPr>
+        <p:spPr/>
+        <p:txBody>
+          <a:bodyPr/>
+          <a:lstStyle/>
+          <a:p>
+            <a:r>
+              <a:rPr lang="en-US" dirty="0"/>
+              <a:t>“seek decimated” Sample</a:t>
+            </a:r>
+          </a:p>
+        </p:txBody>
+      </p:sp>
+      <p:sp>
+        <p:nvSpPr>
+          <p:cNvPr id="2" name="Footer Placeholder 1">
+            <a:extLst>
+              <a:ext uri="{FF2B5EF4-FFF2-40B4-BE49-F238E27FC236}">
+                <a16:creationId xmlns:a16="http://schemas.microsoft.com/office/drawing/2014/main" id="{6FCEFE30-5F1D-43F5-81E7-085E714B77C2}"/>
+              </a:ext>
+            </a:extLst>
+          </p:cNvPr>
+          <p:cNvSpPr>
+            <a:spLocks noGrp="1"/>
+          </p:cNvSpPr>
+          <p:nvPr>
+            <p:ph type="ftr" sz="quarter" idx="11"/>
+          </p:nvPr>
+        </p:nvSpPr>
+        <p:spPr>
+          <a:xfrm>
+            <a:off x="3589991" y="6567029"/>
+            <a:ext cx="4114800" cy="230366"/>
+          </a:xfrm>
+        </p:spPr>
+        <p:txBody>
+          <a:bodyPr/>
+          <a:lstStyle/>
+          <a:p>
+            <a:r>
+              <a:rPr lang="en-US" dirty="0"/>
+              <a:t>Seek Thermal - Confidential Information</a:t>
+            </a:r>
+          </a:p>
+        </p:txBody>
+      </p:sp>
+      <p:sp>
+        <p:nvSpPr>
+          <p:cNvPr id="3" name="Slide Number Placeholder 2">
+            <a:extLst>
+              <a:ext uri="{FF2B5EF4-FFF2-40B4-BE49-F238E27FC236}">
+                <a16:creationId xmlns:a16="http://schemas.microsoft.com/office/drawing/2014/main" id="{0953B861-B0BD-416F-B271-AAEB8BB6B199}"/>
+              </a:ext>
+            </a:extLst>
+          </p:cNvPr>
+          <p:cNvSpPr>
+            <a:spLocks noGrp="1"/>
+          </p:cNvSpPr>
+          <p:nvPr>
+            <p:ph type="sldNum" sz="quarter" idx="12"/>
+          </p:nvPr>
+        </p:nvSpPr>
+        <p:spPr/>
+        <p:txBody>
+          <a:bodyPr/>
+          <a:lstStyle/>
+          <a:p>
+            <a:fld id="{727CC1CB-9F6E-4122-A134-B4A66D88A8C8}" type="slidenum">
+              <a:rPr lang="en-US" smtClean="0"/>
+              <a:pPr/>
+              <a:t>7</a:t>
+            </a:fld>
+            <a:endParaRPr lang="en-US"/>
+          </a:p>
+        </p:txBody>
+      </p:sp>
+      <p:sp>
+        <p:nvSpPr>
+          <p:cNvPr id="44" name="Content Placeholder 43">
+            <a:extLst>
+              <a:ext uri="{FF2B5EF4-FFF2-40B4-BE49-F238E27FC236}">
+                <a16:creationId xmlns:a16="http://schemas.microsoft.com/office/drawing/2014/main" id="{B94F2A1A-FB10-4EA5-B25C-5F85124C2123}"/>
+              </a:ext>
+            </a:extLst>
+          </p:cNvPr>
+          <p:cNvSpPr>
+            <a:spLocks noGrp="1"/>
+          </p:cNvSpPr>
+          <p:nvPr>
+            <p:ph idx="1"/>
+          </p:nvPr>
+        </p:nvSpPr>
+        <p:spPr/>
+        <p:txBody>
+          <a:bodyPr/>
+          <a:lstStyle/>
+          <a:p>
+            <a:r>
+              <a:rPr lang="en-US" dirty="0"/>
+              <a:t>32 BMP Images: 103x78</a:t>
+            </a:r>
+          </a:p>
+        </p:txBody>
+      </p:sp>
+      <p:grpSp>
+        <p:nvGrpSpPr>
+          <p:cNvPr id="108" name="Group 107">
+            <a:extLst>
+              <a:ext uri="{FF2B5EF4-FFF2-40B4-BE49-F238E27FC236}">
+                <a16:creationId xmlns:a16="http://schemas.microsoft.com/office/drawing/2014/main" id="{D4FF388B-DAB7-41EE-A56F-B868D4CE560A}"/>
+              </a:ext>
+            </a:extLst>
+          </p:cNvPr>
+          <p:cNvGrpSpPr/>
+          <p:nvPr/>
+        </p:nvGrpSpPr>
+        <p:grpSpPr>
+          <a:xfrm>
+            <a:off x="341788" y="1673980"/>
+            <a:ext cx="11229538" cy="742950"/>
+            <a:chOff x="299257" y="1567650"/>
+            <a:chExt cx="11229538" cy="742950"/>
+          </a:xfrm>
+        </p:grpSpPr>
+        <p:pic>
+          <p:nvPicPr>
+            <p:cNvPr id="7" name="Picture 6" descr="A person posing for the camera&#10;&#10;Description automatically generated">
+              <a:extLst>
+                <a:ext uri="{FF2B5EF4-FFF2-40B4-BE49-F238E27FC236}">
+                  <a16:creationId xmlns:a16="http://schemas.microsoft.com/office/drawing/2014/main" id="{28E47079-F62A-41FE-84C6-51B0A6A353E4}"/>
+                </a:ext>
+              </a:extLst>
+            </p:cNvPr>
+            <p:cNvPicPr>
+              <a:picLocks noChangeAspect="1"/>
+            </p:cNvPicPr>
+            <p:nvPr/>
+          </p:nvPicPr>
+          <p:blipFill>
+            <a:blip r:embed="rId2">
+              <a:extLst>
+                <a:ext uri="{28A0092B-C50C-407E-A947-70E740481C1C}">
+                  <a14:useLocalDpi xmlns:a14="http://schemas.microsoft.com/office/drawing/2010/main" val="0"/>
+                </a:ext>
+              </a:extLst>
+            </a:blip>
+            <a:stretch>
+              <a:fillRect/>
+            </a:stretch>
+          </p:blipFill>
+          <p:spPr>
+            <a:xfrm>
+              <a:off x="299257" y="1567650"/>
+              <a:ext cx="981075" cy="742950"/>
+            </a:xfrm>
+            <a:prstGeom prst="rect">
+              <a:avLst/>
+            </a:prstGeom>
+          </p:spPr>
+        </p:pic>
+        <p:pic>
+          <p:nvPicPr>
+            <p:cNvPr id="10" name="Picture 9" descr="A person posing for the camera&#10;&#10;Description automatically generated">
+              <a:extLst>
+                <a:ext uri="{FF2B5EF4-FFF2-40B4-BE49-F238E27FC236}">
+                  <a16:creationId xmlns:a16="http://schemas.microsoft.com/office/drawing/2014/main" id="{199C4C7B-3EFA-407A-B078-45C8877E06A4}"/>
+                </a:ext>
+              </a:extLst>
+            </p:cNvPr>
+            <p:cNvPicPr>
+              <a:picLocks noChangeAspect="1"/>
+            </p:cNvPicPr>
+            <p:nvPr/>
+          </p:nvPicPr>
+          <p:blipFill>
+            <a:blip r:embed="rId3">
+              <a:extLst>
+                <a:ext uri="{28A0092B-C50C-407E-A947-70E740481C1C}">
+                  <a14:useLocalDpi xmlns:a14="http://schemas.microsoft.com/office/drawing/2010/main" val="0"/>
+                </a:ext>
+              </a:extLst>
+            </a:blip>
+            <a:stretch>
+              <a:fillRect/>
+            </a:stretch>
+          </p:blipFill>
+          <p:spPr>
+            <a:xfrm>
+              <a:off x="1763323" y="1567650"/>
+              <a:ext cx="981075" cy="742950"/>
+            </a:xfrm>
+            <a:prstGeom prst="rect">
+              <a:avLst/>
+            </a:prstGeom>
+          </p:spPr>
+        </p:pic>
+        <p:pic>
+          <p:nvPicPr>
+            <p:cNvPr id="13" name="Picture 12" descr="A person in a white shirt&#10;&#10;Description automatically generated">
+              <a:extLst>
+                <a:ext uri="{FF2B5EF4-FFF2-40B4-BE49-F238E27FC236}">
+                  <a16:creationId xmlns:a16="http://schemas.microsoft.com/office/drawing/2014/main" id="{31A9BC93-77AF-4F20-9583-46BEDF71D38A}"/>
+                </a:ext>
+              </a:extLst>
+            </p:cNvPr>
+            <p:cNvPicPr>
+              <a:picLocks noChangeAspect="1"/>
+            </p:cNvPicPr>
+            <p:nvPr/>
+          </p:nvPicPr>
+          <p:blipFill>
+            <a:blip r:embed="rId4">
+              <a:extLst>
+                <a:ext uri="{28A0092B-C50C-407E-A947-70E740481C1C}">
+                  <a14:useLocalDpi xmlns:a14="http://schemas.microsoft.com/office/drawing/2010/main" val="0"/>
+                </a:ext>
+              </a:extLst>
+            </a:blip>
+            <a:stretch>
+              <a:fillRect/>
+            </a:stretch>
+          </p:blipFill>
+          <p:spPr>
+            <a:xfrm>
+              <a:off x="3227389" y="1567650"/>
+              <a:ext cx="981075" cy="742950"/>
+            </a:xfrm>
+            <a:prstGeom prst="rect">
+              <a:avLst/>
+            </a:prstGeom>
+          </p:spPr>
+        </p:pic>
+        <p:pic>
+          <p:nvPicPr>
+            <p:cNvPr id="15" name="Picture 14" descr="A person in a white shirt&#10;&#10;Description automatically generated">
+              <a:extLst>
+                <a:ext uri="{FF2B5EF4-FFF2-40B4-BE49-F238E27FC236}">
+                  <a16:creationId xmlns:a16="http://schemas.microsoft.com/office/drawing/2014/main" id="{12804189-C87F-454A-8B66-9C1352E9EF87}"/>
+                </a:ext>
+              </a:extLst>
+            </p:cNvPr>
+            <p:cNvPicPr>
+              <a:picLocks noChangeAspect="1"/>
+            </p:cNvPicPr>
+            <p:nvPr/>
+          </p:nvPicPr>
+          <p:blipFill>
+            <a:blip r:embed="rId5">
+              <a:extLst>
+                <a:ext uri="{28A0092B-C50C-407E-A947-70E740481C1C}">
+                  <a14:useLocalDpi xmlns:a14="http://schemas.microsoft.com/office/drawing/2010/main" val="0"/>
+                </a:ext>
+              </a:extLst>
+            </a:blip>
+            <a:stretch>
+              <a:fillRect/>
+            </a:stretch>
+          </p:blipFill>
+          <p:spPr>
+            <a:xfrm>
+              <a:off x="4691455" y="1567650"/>
+              <a:ext cx="981075" cy="742950"/>
+            </a:xfrm>
+            <a:prstGeom prst="rect">
+              <a:avLst/>
+            </a:prstGeom>
+          </p:spPr>
+        </p:pic>
+        <p:pic>
+          <p:nvPicPr>
+            <p:cNvPr id="18" name="Picture 17" descr="A person in a white shirt&#10;&#10;Description automatically generated">
+              <a:extLst>
+                <a:ext uri="{FF2B5EF4-FFF2-40B4-BE49-F238E27FC236}">
+                  <a16:creationId xmlns:a16="http://schemas.microsoft.com/office/drawing/2014/main" id="{B105DC55-8A5C-4560-9F8F-D74302076A2A}"/>
+                </a:ext>
+              </a:extLst>
+            </p:cNvPr>
+            <p:cNvPicPr>
+              <a:picLocks noChangeAspect="1"/>
+            </p:cNvPicPr>
+            <p:nvPr/>
+          </p:nvPicPr>
+          <p:blipFill>
+            <a:blip r:embed="rId6">
+              <a:extLst>
+                <a:ext uri="{28A0092B-C50C-407E-A947-70E740481C1C}">
+                  <a14:useLocalDpi xmlns:a14="http://schemas.microsoft.com/office/drawing/2010/main" val="0"/>
+                </a:ext>
+              </a:extLst>
+            </a:blip>
+            <a:stretch>
+              <a:fillRect/>
+            </a:stretch>
+          </p:blipFill>
+          <p:spPr>
+            <a:xfrm>
+              <a:off x="6155521" y="1567650"/>
+              <a:ext cx="981075" cy="742950"/>
+            </a:xfrm>
+            <a:prstGeom prst="rect">
+              <a:avLst/>
+            </a:prstGeom>
+          </p:spPr>
+        </p:pic>
+        <p:pic>
+          <p:nvPicPr>
+            <p:cNvPr id="21" name="Picture 20" descr="A person in a white shirt&#10;&#10;Description automatically generated">
+              <a:extLst>
+                <a:ext uri="{FF2B5EF4-FFF2-40B4-BE49-F238E27FC236}">
+                  <a16:creationId xmlns:a16="http://schemas.microsoft.com/office/drawing/2014/main" id="{BB7E7AB6-A305-4B0F-8F03-C0BC32DC2499}"/>
+                </a:ext>
+              </a:extLst>
+            </p:cNvPr>
+            <p:cNvPicPr>
+              <a:picLocks noChangeAspect="1"/>
+            </p:cNvPicPr>
+            <p:nvPr/>
+          </p:nvPicPr>
+          <p:blipFill>
+            <a:blip r:embed="rId7">
+              <a:extLst>
+                <a:ext uri="{28A0092B-C50C-407E-A947-70E740481C1C}">
+                  <a14:useLocalDpi xmlns:a14="http://schemas.microsoft.com/office/drawing/2010/main" val="0"/>
+                </a:ext>
+              </a:extLst>
+            </a:blip>
+            <a:stretch>
+              <a:fillRect/>
+            </a:stretch>
+          </p:blipFill>
+          <p:spPr>
+            <a:xfrm>
+              <a:off x="7619587" y="1567650"/>
+              <a:ext cx="981075" cy="742950"/>
+            </a:xfrm>
+            <a:prstGeom prst="rect">
+              <a:avLst/>
+            </a:prstGeom>
+          </p:spPr>
+        </p:pic>
+        <p:pic>
+          <p:nvPicPr>
+            <p:cNvPr id="23" name="Picture 22" descr="A person in a white shirt&#10;&#10;Description automatically generated">
+              <a:extLst>
+                <a:ext uri="{FF2B5EF4-FFF2-40B4-BE49-F238E27FC236}">
+                  <a16:creationId xmlns:a16="http://schemas.microsoft.com/office/drawing/2014/main" id="{142926EA-62D5-49B9-8057-1885C71C70DD}"/>
+                </a:ext>
+              </a:extLst>
+            </p:cNvPr>
+            <p:cNvPicPr>
+              <a:picLocks noChangeAspect="1"/>
+            </p:cNvPicPr>
+            <p:nvPr/>
+          </p:nvPicPr>
+          <p:blipFill>
+            <a:blip r:embed="rId8">
+              <a:extLst>
+                <a:ext uri="{28A0092B-C50C-407E-A947-70E740481C1C}">
+                  <a14:useLocalDpi xmlns:a14="http://schemas.microsoft.com/office/drawing/2010/main" val="0"/>
+                </a:ext>
+              </a:extLst>
+            </a:blip>
+            <a:stretch>
+              <a:fillRect/>
+            </a:stretch>
+          </p:blipFill>
+          <p:spPr>
+            <a:xfrm>
+              <a:off x="9083653" y="1567650"/>
+              <a:ext cx="981075" cy="742950"/>
+            </a:xfrm>
+            <a:prstGeom prst="rect">
+              <a:avLst/>
+            </a:prstGeom>
+          </p:spPr>
+        </p:pic>
+        <p:pic>
+          <p:nvPicPr>
+            <p:cNvPr id="26" name="Picture 25" descr="A person in a white shirt&#10;&#10;Description automatically generated">
+              <a:extLst>
+                <a:ext uri="{FF2B5EF4-FFF2-40B4-BE49-F238E27FC236}">
+                  <a16:creationId xmlns:a16="http://schemas.microsoft.com/office/drawing/2014/main" id="{1AEFED1B-CBFE-48F3-B37A-C59224A90B49}"/>
+                </a:ext>
+              </a:extLst>
+            </p:cNvPr>
+            <p:cNvPicPr>
+              <a:picLocks noChangeAspect="1"/>
+            </p:cNvPicPr>
+            <p:nvPr/>
+          </p:nvPicPr>
+          <p:blipFill>
+            <a:blip r:embed="rId9">
+              <a:extLst>
+                <a:ext uri="{28A0092B-C50C-407E-A947-70E740481C1C}">
+                  <a14:useLocalDpi xmlns:a14="http://schemas.microsoft.com/office/drawing/2010/main" val="0"/>
+                </a:ext>
+              </a:extLst>
+            </a:blip>
+            <a:stretch>
+              <a:fillRect/>
+            </a:stretch>
+          </p:blipFill>
+          <p:spPr>
+            <a:xfrm>
+              <a:off x="10547720" y="1567650"/>
+              <a:ext cx="981075" cy="742950"/>
+            </a:xfrm>
+            <a:prstGeom prst="rect">
+              <a:avLst/>
+            </a:prstGeom>
+          </p:spPr>
+        </p:pic>
+      </p:grpSp>
+      <p:grpSp>
+        <p:nvGrpSpPr>
+          <p:cNvPr id="107" name="Group 106">
+            <a:extLst>
+              <a:ext uri="{FF2B5EF4-FFF2-40B4-BE49-F238E27FC236}">
+                <a16:creationId xmlns:a16="http://schemas.microsoft.com/office/drawing/2014/main" id="{F92CCB3B-5D78-4865-BDAC-E5A3206F9043}"/>
+              </a:ext>
+            </a:extLst>
+          </p:cNvPr>
+          <p:cNvGrpSpPr/>
+          <p:nvPr/>
+        </p:nvGrpSpPr>
+        <p:grpSpPr>
+          <a:xfrm>
+            <a:off x="348556" y="2818648"/>
+            <a:ext cx="11233405" cy="757234"/>
+            <a:chOff x="295391" y="2648520"/>
+            <a:chExt cx="11233405" cy="757234"/>
+          </a:xfrm>
+        </p:grpSpPr>
+        <p:pic>
+          <p:nvPicPr>
+            <p:cNvPr id="29" name="Picture 28" descr="A person in a white shirt&#10;&#10;Description automatically generated">
+              <a:extLst>
+                <a:ext uri="{FF2B5EF4-FFF2-40B4-BE49-F238E27FC236}">
+                  <a16:creationId xmlns:a16="http://schemas.microsoft.com/office/drawing/2014/main" id="{2EED750D-00C4-4992-BE4C-E208EA4EA13A}"/>
+                </a:ext>
+              </a:extLst>
+            </p:cNvPr>
+            <p:cNvPicPr>
+              <a:picLocks noChangeAspect="1"/>
+            </p:cNvPicPr>
+            <p:nvPr/>
+          </p:nvPicPr>
+          <p:blipFill>
+            <a:blip r:embed="rId10">
+              <a:extLst>
+                <a:ext uri="{28A0092B-C50C-407E-A947-70E740481C1C}">
+                  <a14:useLocalDpi xmlns:a14="http://schemas.microsoft.com/office/drawing/2010/main" val="0"/>
+                </a:ext>
+              </a:extLst>
+            </a:blip>
+            <a:stretch>
+              <a:fillRect/>
+            </a:stretch>
+          </p:blipFill>
+          <p:spPr>
+            <a:xfrm>
+              <a:off x="295391" y="2662804"/>
+              <a:ext cx="981075" cy="742950"/>
+            </a:xfrm>
+            <a:prstGeom prst="rect">
+              <a:avLst/>
+            </a:prstGeom>
+          </p:spPr>
+        </p:pic>
+        <p:pic>
+          <p:nvPicPr>
+            <p:cNvPr id="31" name="Picture 30" descr="A person in a white shirt&#10;&#10;Description automatically generated">
+              <a:extLst>
+                <a:ext uri="{FF2B5EF4-FFF2-40B4-BE49-F238E27FC236}">
+                  <a16:creationId xmlns:a16="http://schemas.microsoft.com/office/drawing/2014/main" id="{46CBB589-2B2C-4F92-8592-F03DAAEB2A2D}"/>
+                </a:ext>
+              </a:extLst>
+            </p:cNvPr>
+            <p:cNvPicPr>
+              <a:picLocks noChangeAspect="1"/>
+            </p:cNvPicPr>
+            <p:nvPr/>
+          </p:nvPicPr>
+          <p:blipFill>
+            <a:blip r:embed="rId11">
+              <a:extLst>
+                <a:ext uri="{28A0092B-C50C-407E-A947-70E740481C1C}">
+                  <a14:useLocalDpi xmlns:a14="http://schemas.microsoft.com/office/drawing/2010/main" val="0"/>
+                </a:ext>
+              </a:extLst>
+            </a:blip>
+            <a:stretch>
+              <a:fillRect/>
+            </a:stretch>
+          </p:blipFill>
+          <p:spPr>
+            <a:xfrm>
+              <a:off x="1760010" y="2662804"/>
+              <a:ext cx="981075" cy="742950"/>
+            </a:xfrm>
+            <a:prstGeom prst="rect">
+              <a:avLst/>
+            </a:prstGeom>
+          </p:spPr>
+        </p:pic>
+        <p:pic>
+          <p:nvPicPr>
+            <p:cNvPr id="34" name="Picture 33" descr="A person in a white shirt&#10;&#10;Description automatically generated">
+              <a:extLst>
+                <a:ext uri="{FF2B5EF4-FFF2-40B4-BE49-F238E27FC236}">
+                  <a16:creationId xmlns:a16="http://schemas.microsoft.com/office/drawing/2014/main" id="{17AD6C2F-687D-4E82-8D42-435276D5F826}"/>
+                </a:ext>
+              </a:extLst>
+            </p:cNvPr>
+            <p:cNvPicPr>
+              <a:picLocks noChangeAspect="1"/>
+            </p:cNvPicPr>
+            <p:nvPr/>
+          </p:nvPicPr>
+          <p:blipFill>
+            <a:blip r:embed="rId12">
+              <a:extLst>
+                <a:ext uri="{28A0092B-C50C-407E-A947-70E740481C1C}">
+                  <a14:useLocalDpi xmlns:a14="http://schemas.microsoft.com/office/drawing/2010/main" val="0"/>
+                </a:ext>
+              </a:extLst>
+            </a:blip>
+            <a:stretch>
+              <a:fillRect/>
+            </a:stretch>
+          </p:blipFill>
+          <p:spPr>
+            <a:xfrm>
+              <a:off x="3224629" y="2662804"/>
+              <a:ext cx="981075" cy="742950"/>
+            </a:xfrm>
+            <a:prstGeom prst="rect">
+              <a:avLst/>
+            </a:prstGeom>
+          </p:spPr>
+        </p:pic>
+        <p:pic>
+          <p:nvPicPr>
+            <p:cNvPr id="37" name="Picture 36" descr="A person in a white shirt&#10;&#10;Description automatically generated">
+              <a:extLst>
+                <a:ext uri="{FF2B5EF4-FFF2-40B4-BE49-F238E27FC236}">
+                  <a16:creationId xmlns:a16="http://schemas.microsoft.com/office/drawing/2014/main" id="{A8DAE404-8E17-434F-B76F-A347B5E96686}"/>
+                </a:ext>
+              </a:extLst>
+            </p:cNvPr>
+            <p:cNvPicPr>
+              <a:picLocks noChangeAspect="1"/>
+            </p:cNvPicPr>
+            <p:nvPr/>
+          </p:nvPicPr>
+          <p:blipFill>
+            <a:blip r:embed="rId13">
+              <a:extLst>
+                <a:ext uri="{28A0092B-C50C-407E-A947-70E740481C1C}">
+                  <a14:useLocalDpi xmlns:a14="http://schemas.microsoft.com/office/drawing/2010/main" val="0"/>
+                </a:ext>
+              </a:extLst>
+            </a:blip>
+            <a:stretch>
+              <a:fillRect/>
+            </a:stretch>
+          </p:blipFill>
+          <p:spPr>
+            <a:xfrm>
+              <a:off x="4689248" y="2662804"/>
+              <a:ext cx="981075" cy="742950"/>
+            </a:xfrm>
+            <a:prstGeom prst="rect">
+              <a:avLst/>
+            </a:prstGeom>
+          </p:spPr>
+        </p:pic>
+        <p:pic>
+          <p:nvPicPr>
+            <p:cNvPr id="39" name="Picture 38" descr="A person in a white shirt&#10;&#10;Description automatically generated">
+              <a:extLst>
+                <a:ext uri="{FF2B5EF4-FFF2-40B4-BE49-F238E27FC236}">
+                  <a16:creationId xmlns:a16="http://schemas.microsoft.com/office/drawing/2014/main" id="{1A44964E-DF64-4A02-B8F3-A479D635E9CA}"/>
+                </a:ext>
+              </a:extLst>
+            </p:cNvPr>
+            <p:cNvPicPr>
+              <a:picLocks noChangeAspect="1"/>
+            </p:cNvPicPr>
+            <p:nvPr/>
+          </p:nvPicPr>
+          <p:blipFill>
+            <a:blip r:embed="rId14">
+              <a:extLst>
+                <a:ext uri="{28A0092B-C50C-407E-A947-70E740481C1C}">
+                  <a14:useLocalDpi xmlns:a14="http://schemas.microsoft.com/office/drawing/2010/main" val="0"/>
+                </a:ext>
+              </a:extLst>
+            </a:blip>
+            <a:stretch>
+              <a:fillRect/>
+            </a:stretch>
+          </p:blipFill>
+          <p:spPr>
+            <a:xfrm>
+              <a:off x="6153867" y="2662804"/>
+              <a:ext cx="981075" cy="742950"/>
+            </a:xfrm>
+            <a:prstGeom prst="rect">
+              <a:avLst/>
+            </a:prstGeom>
+          </p:spPr>
+        </p:pic>
+        <p:pic>
+          <p:nvPicPr>
+            <p:cNvPr id="43" name="Picture 42" descr="A person in a white shirt&#10;&#10;Description automatically generated">
+              <a:extLst>
+                <a:ext uri="{FF2B5EF4-FFF2-40B4-BE49-F238E27FC236}">
+                  <a16:creationId xmlns:a16="http://schemas.microsoft.com/office/drawing/2014/main" id="{5675F3C8-7170-4167-A4E7-AFAAF8486371}"/>
+                </a:ext>
+              </a:extLst>
+            </p:cNvPr>
+            <p:cNvPicPr>
+              <a:picLocks noChangeAspect="1"/>
+            </p:cNvPicPr>
+            <p:nvPr/>
+          </p:nvPicPr>
+          <p:blipFill>
+            <a:blip r:embed="rId15">
+              <a:extLst>
+                <a:ext uri="{28A0092B-C50C-407E-A947-70E740481C1C}">
+                  <a14:useLocalDpi xmlns:a14="http://schemas.microsoft.com/office/drawing/2010/main" val="0"/>
+                </a:ext>
+              </a:extLst>
+            </a:blip>
+            <a:stretch>
+              <a:fillRect/>
+            </a:stretch>
+          </p:blipFill>
+          <p:spPr>
+            <a:xfrm>
+              <a:off x="7618486" y="2662804"/>
+              <a:ext cx="981075" cy="742950"/>
+            </a:xfrm>
+            <a:prstGeom prst="rect">
+              <a:avLst/>
+            </a:prstGeom>
+          </p:spPr>
+        </p:pic>
+        <p:pic>
+          <p:nvPicPr>
+            <p:cNvPr id="48" name="Picture 47" descr="A person in a white shirt&#10;&#10;Description automatically generated">
+              <a:extLst>
+                <a:ext uri="{FF2B5EF4-FFF2-40B4-BE49-F238E27FC236}">
+                  <a16:creationId xmlns:a16="http://schemas.microsoft.com/office/drawing/2014/main" id="{B38682E1-F883-480F-A269-93FEA34850FE}"/>
+                </a:ext>
+              </a:extLst>
+            </p:cNvPr>
+            <p:cNvPicPr>
+              <a:picLocks noChangeAspect="1"/>
+            </p:cNvPicPr>
+            <p:nvPr/>
+          </p:nvPicPr>
+          <p:blipFill>
+            <a:blip r:embed="rId16">
+              <a:extLst>
+                <a:ext uri="{28A0092B-C50C-407E-A947-70E740481C1C}">
+                  <a14:useLocalDpi xmlns:a14="http://schemas.microsoft.com/office/drawing/2010/main" val="0"/>
+                </a:ext>
+              </a:extLst>
+            </a:blip>
+            <a:stretch>
+              <a:fillRect/>
+            </a:stretch>
+          </p:blipFill>
+          <p:spPr>
+            <a:xfrm>
+              <a:off x="9083105" y="2662804"/>
+              <a:ext cx="981075" cy="742950"/>
+            </a:xfrm>
+            <a:prstGeom prst="rect">
+              <a:avLst/>
+            </a:prstGeom>
+          </p:spPr>
+        </p:pic>
+        <p:pic>
+          <p:nvPicPr>
+            <p:cNvPr id="50" name="Picture 49" descr="A person posing for the camera&#10;&#10;Description automatically generated">
+              <a:extLst>
+                <a:ext uri="{FF2B5EF4-FFF2-40B4-BE49-F238E27FC236}">
+                  <a16:creationId xmlns:a16="http://schemas.microsoft.com/office/drawing/2014/main" id="{39FA4592-585E-420D-B49E-AEB9D6150498}"/>
+                </a:ext>
+              </a:extLst>
+            </p:cNvPr>
+            <p:cNvPicPr>
+              <a:picLocks noChangeAspect="1"/>
+            </p:cNvPicPr>
+            <p:nvPr/>
+          </p:nvPicPr>
+          <p:blipFill>
+            <a:blip r:embed="rId17">
+              <a:extLst>
+                <a:ext uri="{28A0092B-C50C-407E-A947-70E740481C1C}">
+                  <a14:useLocalDpi xmlns:a14="http://schemas.microsoft.com/office/drawing/2010/main" val="0"/>
+                </a:ext>
+              </a:extLst>
+            </a:blip>
+            <a:stretch>
+              <a:fillRect/>
+            </a:stretch>
+          </p:blipFill>
+          <p:spPr>
+            <a:xfrm>
+              <a:off x="10547721" y="2648520"/>
+              <a:ext cx="981075" cy="742950"/>
+            </a:xfrm>
+            <a:prstGeom prst="rect">
+              <a:avLst/>
+            </a:prstGeom>
+          </p:spPr>
+        </p:pic>
+      </p:grpSp>
+      <p:grpSp>
+        <p:nvGrpSpPr>
+          <p:cNvPr id="106" name="Group 105">
+            <a:extLst>
+              <a:ext uri="{FF2B5EF4-FFF2-40B4-BE49-F238E27FC236}">
+                <a16:creationId xmlns:a16="http://schemas.microsoft.com/office/drawing/2014/main" id="{2F5D57CC-7A78-403C-B839-36015EA28FD0}"/>
+              </a:ext>
+            </a:extLst>
+          </p:cNvPr>
+          <p:cNvGrpSpPr/>
+          <p:nvPr/>
+        </p:nvGrpSpPr>
+        <p:grpSpPr>
+          <a:xfrm>
+            <a:off x="337923" y="4021690"/>
+            <a:ext cx="11233405" cy="742950"/>
+            <a:chOff x="295391" y="3660184"/>
+            <a:chExt cx="11233405" cy="742950"/>
+          </a:xfrm>
+        </p:grpSpPr>
+        <p:pic>
+          <p:nvPicPr>
+            <p:cNvPr id="54" name="Picture 53" descr="A person posing for the camera&#10;&#10;Description automatically generated">
+              <a:extLst>
+                <a:ext uri="{FF2B5EF4-FFF2-40B4-BE49-F238E27FC236}">
+                  <a16:creationId xmlns:a16="http://schemas.microsoft.com/office/drawing/2014/main" id="{792EF1BD-6A2C-40F1-9457-CE7D9CCE2D6E}"/>
+                </a:ext>
+              </a:extLst>
+            </p:cNvPr>
+            <p:cNvPicPr>
+              <a:picLocks noChangeAspect="1"/>
+            </p:cNvPicPr>
+            <p:nvPr/>
+          </p:nvPicPr>
+          <p:blipFill>
+            <a:blip r:embed="rId18">
+              <a:extLst>
+                <a:ext uri="{28A0092B-C50C-407E-A947-70E740481C1C}">
+                  <a14:useLocalDpi xmlns:a14="http://schemas.microsoft.com/office/drawing/2010/main" val="0"/>
+                </a:ext>
+              </a:extLst>
+            </a:blip>
+            <a:stretch>
+              <a:fillRect/>
+            </a:stretch>
+          </p:blipFill>
+          <p:spPr>
+            <a:xfrm>
+              <a:off x="295391" y="3660184"/>
+              <a:ext cx="981075" cy="742950"/>
+            </a:xfrm>
+            <a:prstGeom prst="rect">
+              <a:avLst/>
+            </a:prstGeom>
+          </p:spPr>
+        </p:pic>
+        <p:pic>
+          <p:nvPicPr>
+            <p:cNvPr id="58" name="Picture 57" descr="A person posing for the camera&#10;&#10;Description automatically generated">
+              <a:extLst>
+                <a:ext uri="{FF2B5EF4-FFF2-40B4-BE49-F238E27FC236}">
+                  <a16:creationId xmlns:a16="http://schemas.microsoft.com/office/drawing/2014/main" id="{892798DF-A746-4B3E-81B3-1B8B501589C9}"/>
+                </a:ext>
+              </a:extLst>
+            </p:cNvPr>
+            <p:cNvPicPr>
+              <a:picLocks noChangeAspect="1"/>
+            </p:cNvPicPr>
+            <p:nvPr/>
+          </p:nvPicPr>
+          <p:blipFill>
+            <a:blip r:embed="rId19">
+              <a:extLst>
+                <a:ext uri="{28A0092B-C50C-407E-A947-70E740481C1C}">
+                  <a14:useLocalDpi xmlns:a14="http://schemas.microsoft.com/office/drawing/2010/main" val="0"/>
+                </a:ext>
+              </a:extLst>
+            </a:blip>
+            <a:stretch>
+              <a:fillRect/>
+            </a:stretch>
+          </p:blipFill>
+          <p:spPr>
+            <a:xfrm>
+              <a:off x="1760010" y="3660184"/>
+              <a:ext cx="981075" cy="742950"/>
+            </a:xfrm>
+            <a:prstGeom prst="rect">
+              <a:avLst/>
+            </a:prstGeom>
+          </p:spPr>
+        </p:pic>
+        <p:pic>
+          <p:nvPicPr>
+            <p:cNvPr id="62" name="Picture 61" descr="A person in a white shirt&#10;&#10;Description automatically generated">
+              <a:extLst>
+                <a:ext uri="{FF2B5EF4-FFF2-40B4-BE49-F238E27FC236}">
+                  <a16:creationId xmlns:a16="http://schemas.microsoft.com/office/drawing/2014/main" id="{94B07CC3-B701-4CA5-AF17-630F910C3C45}"/>
+                </a:ext>
+              </a:extLst>
+            </p:cNvPr>
+            <p:cNvPicPr>
+              <a:picLocks noChangeAspect="1"/>
+            </p:cNvPicPr>
+            <p:nvPr/>
+          </p:nvPicPr>
+          <p:blipFill>
+            <a:blip r:embed="rId20">
+              <a:extLst>
+                <a:ext uri="{28A0092B-C50C-407E-A947-70E740481C1C}">
+                  <a14:useLocalDpi xmlns:a14="http://schemas.microsoft.com/office/drawing/2010/main" val="0"/>
+                </a:ext>
+              </a:extLst>
+            </a:blip>
+            <a:stretch>
+              <a:fillRect/>
+            </a:stretch>
+          </p:blipFill>
+          <p:spPr>
+            <a:xfrm>
+              <a:off x="3224629" y="3660184"/>
+              <a:ext cx="981075" cy="742950"/>
+            </a:xfrm>
+            <a:prstGeom prst="rect">
+              <a:avLst/>
+            </a:prstGeom>
+          </p:spPr>
+        </p:pic>
+        <p:pic>
+          <p:nvPicPr>
+            <p:cNvPr id="66" name="Picture 65" descr="A person in a white shirt&#10;&#10;Description automatically generated">
+              <a:extLst>
+                <a:ext uri="{FF2B5EF4-FFF2-40B4-BE49-F238E27FC236}">
+                  <a16:creationId xmlns:a16="http://schemas.microsoft.com/office/drawing/2014/main" id="{B8911F36-4890-45F1-9CEE-602795EB9316}"/>
+                </a:ext>
+              </a:extLst>
+            </p:cNvPr>
+            <p:cNvPicPr>
+              <a:picLocks noChangeAspect="1"/>
+            </p:cNvPicPr>
+            <p:nvPr/>
+          </p:nvPicPr>
+          <p:blipFill>
+            <a:blip r:embed="rId21">
+              <a:extLst>
+                <a:ext uri="{28A0092B-C50C-407E-A947-70E740481C1C}">
+                  <a14:useLocalDpi xmlns:a14="http://schemas.microsoft.com/office/drawing/2010/main" val="0"/>
+                </a:ext>
+              </a:extLst>
+            </a:blip>
+            <a:stretch>
+              <a:fillRect/>
+            </a:stretch>
+          </p:blipFill>
+          <p:spPr>
+            <a:xfrm>
+              <a:off x="4689248" y="3660184"/>
+              <a:ext cx="981075" cy="742950"/>
+            </a:xfrm>
+            <a:prstGeom prst="rect">
+              <a:avLst/>
+            </a:prstGeom>
+          </p:spPr>
+        </p:pic>
+        <p:pic>
+          <p:nvPicPr>
+            <p:cNvPr id="70" name="Picture 69" descr="A person in a white shirt&#10;&#10;Description automatically generated">
+              <a:extLst>
+                <a:ext uri="{FF2B5EF4-FFF2-40B4-BE49-F238E27FC236}">
+                  <a16:creationId xmlns:a16="http://schemas.microsoft.com/office/drawing/2014/main" id="{7B294125-E4AB-4E92-BCC3-0A15D63E7854}"/>
+                </a:ext>
+              </a:extLst>
+            </p:cNvPr>
+            <p:cNvPicPr>
+              <a:picLocks noChangeAspect="1"/>
+            </p:cNvPicPr>
+            <p:nvPr/>
+          </p:nvPicPr>
+          <p:blipFill>
+            <a:blip r:embed="rId22">
+              <a:extLst>
+                <a:ext uri="{28A0092B-C50C-407E-A947-70E740481C1C}">
+                  <a14:useLocalDpi xmlns:a14="http://schemas.microsoft.com/office/drawing/2010/main" val="0"/>
+                </a:ext>
+              </a:extLst>
+            </a:blip>
+            <a:stretch>
+              <a:fillRect/>
+            </a:stretch>
+          </p:blipFill>
+          <p:spPr>
+            <a:xfrm>
+              <a:off x="6153867" y="3660184"/>
+              <a:ext cx="981075" cy="742950"/>
+            </a:xfrm>
+            <a:prstGeom prst="rect">
+              <a:avLst/>
+            </a:prstGeom>
+          </p:spPr>
+        </p:pic>
+        <p:pic>
+          <p:nvPicPr>
+            <p:cNvPr id="74" name="Picture 73" descr="A person in a white shirt&#10;&#10;Description automatically generated">
+              <a:extLst>
+                <a:ext uri="{FF2B5EF4-FFF2-40B4-BE49-F238E27FC236}">
+                  <a16:creationId xmlns:a16="http://schemas.microsoft.com/office/drawing/2014/main" id="{4199A866-E957-4F80-A440-C98FA01D1100}"/>
+                </a:ext>
+              </a:extLst>
+            </p:cNvPr>
+            <p:cNvPicPr>
+              <a:picLocks noChangeAspect="1"/>
+            </p:cNvPicPr>
+            <p:nvPr/>
+          </p:nvPicPr>
+          <p:blipFill>
+            <a:blip r:embed="rId23">
+              <a:extLst>
+                <a:ext uri="{28A0092B-C50C-407E-A947-70E740481C1C}">
+                  <a14:useLocalDpi xmlns:a14="http://schemas.microsoft.com/office/drawing/2010/main" val="0"/>
+                </a:ext>
+              </a:extLst>
+            </a:blip>
+            <a:stretch>
+              <a:fillRect/>
+            </a:stretch>
+          </p:blipFill>
+          <p:spPr>
+            <a:xfrm>
+              <a:off x="7618486" y="3660184"/>
+              <a:ext cx="981075" cy="742950"/>
+            </a:xfrm>
+            <a:prstGeom prst="rect">
+              <a:avLst/>
+            </a:prstGeom>
+          </p:spPr>
+        </p:pic>
+        <p:pic>
+          <p:nvPicPr>
+            <p:cNvPr id="78" name="Picture 77" descr="A person in a white shirt&#10;&#10;Description automatically generated">
+              <a:extLst>
+                <a:ext uri="{FF2B5EF4-FFF2-40B4-BE49-F238E27FC236}">
+                  <a16:creationId xmlns:a16="http://schemas.microsoft.com/office/drawing/2014/main" id="{23CF86D1-2EA0-49ED-AB18-FFAFFF9BACFD}"/>
+                </a:ext>
+              </a:extLst>
+            </p:cNvPr>
+            <p:cNvPicPr>
+              <a:picLocks noChangeAspect="1"/>
+            </p:cNvPicPr>
+            <p:nvPr/>
+          </p:nvPicPr>
+          <p:blipFill>
+            <a:blip r:embed="rId24">
+              <a:extLst>
+                <a:ext uri="{28A0092B-C50C-407E-A947-70E740481C1C}">
+                  <a14:useLocalDpi xmlns:a14="http://schemas.microsoft.com/office/drawing/2010/main" val="0"/>
+                </a:ext>
+              </a:extLst>
+            </a:blip>
+            <a:stretch>
+              <a:fillRect/>
+            </a:stretch>
+          </p:blipFill>
+          <p:spPr>
+            <a:xfrm>
+              <a:off x="9083105" y="3660184"/>
+              <a:ext cx="981075" cy="742950"/>
+            </a:xfrm>
+            <a:prstGeom prst="rect">
+              <a:avLst/>
+            </a:prstGeom>
+          </p:spPr>
+        </p:pic>
+        <p:pic>
+          <p:nvPicPr>
+            <p:cNvPr id="82" name="Picture 81" descr="A person in a white shirt&#10;&#10;Description automatically generated">
+              <a:extLst>
+                <a:ext uri="{FF2B5EF4-FFF2-40B4-BE49-F238E27FC236}">
+                  <a16:creationId xmlns:a16="http://schemas.microsoft.com/office/drawing/2014/main" id="{7DB8A2D6-48CE-44F8-AAF2-0401C95B19EE}"/>
+                </a:ext>
+              </a:extLst>
+            </p:cNvPr>
+            <p:cNvPicPr>
+              <a:picLocks noChangeAspect="1"/>
+            </p:cNvPicPr>
+            <p:nvPr/>
+          </p:nvPicPr>
+          <p:blipFill>
+            <a:blip r:embed="rId25">
+              <a:extLst>
+                <a:ext uri="{28A0092B-C50C-407E-A947-70E740481C1C}">
+                  <a14:useLocalDpi xmlns:a14="http://schemas.microsoft.com/office/drawing/2010/main" val="0"/>
+                </a:ext>
+              </a:extLst>
+            </a:blip>
+            <a:stretch>
+              <a:fillRect/>
+            </a:stretch>
+          </p:blipFill>
+          <p:spPr>
+            <a:xfrm>
+              <a:off x="10547721" y="3660184"/>
+              <a:ext cx="981075" cy="742950"/>
+            </a:xfrm>
+            <a:prstGeom prst="rect">
+              <a:avLst/>
+            </a:prstGeom>
+          </p:spPr>
+        </p:pic>
+      </p:grpSp>
+      <p:grpSp>
+        <p:nvGrpSpPr>
+          <p:cNvPr id="105" name="Group 104">
+            <a:extLst>
+              <a:ext uri="{FF2B5EF4-FFF2-40B4-BE49-F238E27FC236}">
+                <a16:creationId xmlns:a16="http://schemas.microsoft.com/office/drawing/2014/main" id="{A47214C2-FDC9-4A8B-BD98-7DD4373D5D66}"/>
+              </a:ext>
+            </a:extLst>
+          </p:cNvPr>
+          <p:cNvGrpSpPr/>
+          <p:nvPr/>
+        </p:nvGrpSpPr>
+        <p:grpSpPr>
+          <a:xfrm>
+            <a:off x="361245" y="5064359"/>
+            <a:ext cx="11167551" cy="742950"/>
+            <a:chOff x="361245" y="5064359"/>
+            <a:chExt cx="11167551" cy="742950"/>
+          </a:xfrm>
+        </p:grpSpPr>
+        <p:pic>
+          <p:nvPicPr>
+            <p:cNvPr id="86" name="Picture 85" descr="A person in a white shirt&#10;&#10;Description automatically generated">
+              <a:extLst>
+                <a:ext uri="{FF2B5EF4-FFF2-40B4-BE49-F238E27FC236}">
+                  <a16:creationId xmlns:a16="http://schemas.microsoft.com/office/drawing/2014/main" id="{767F10DE-E42D-468B-966D-DC3AFE1E233F}"/>
+                </a:ext>
+              </a:extLst>
+            </p:cNvPr>
+            <p:cNvPicPr>
+              <a:picLocks noChangeAspect="1"/>
+            </p:cNvPicPr>
+            <p:nvPr/>
+          </p:nvPicPr>
+          <p:blipFill>
+            <a:blip r:embed="rId26">
+              <a:extLst>
+                <a:ext uri="{28A0092B-C50C-407E-A947-70E740481C1C}">
+                  <a14:useLocalDpi xmlns:a14="http://schemas.microsoft.com/office/drawing/2010/main" val="0"/>
+                </a:ext>
+              </a:extLst>
+            </a:blip>
+            <a:stretch>
+              <a:fillRect/>
+            </a:stretch>
+          </p:blipFill>
+          <p:spPr>
+            <a:xfrm>
+              <a:off x="361245" y="5064359"/>
+              <a:ext cx="981075" cy="742950"/>
+            </a:xfrm>
+            <a:prstGeom prst="rect">
+              <a:avLst/>
+            </a:prstGeom>
+          </p:spPr>
+        </p:pic>
+        <p:pic>
+          <p:nvPicPr>
+            <p:cNvPr id="90" name="Picture 89" descr="A person in a white shirt&#10;&#10;Description automatically generated">
+              <a:extLst>
+                <a:ext uri="{FF2B5EF4-FFF2-40B4-BE49-F238E27FC236}">
+                  <a16:creationId xmlns:a16="http://schemas.microsoft.com/office/drawing/2014/main" id="{E7BCC871-BEDF-41C0-94F9-47AEEC5EE9C4}"/>
+                </a:ext>
+              </a:extLst>
+            </p:cNvPr>
+            <p:cNvPicPr>
+              <a:picLocks noChangeAspect="1"/>
+            </p:cNvPicPr>
+            <p:nvPr/>
+          </p:nvPicPr>
+          <p:blipFill>
+            <a:blip r:embed="rId27">
+              <a:extLst>
+                <a:ext uri="{28A0092B-C50C-407E-A947-70E740481C1C}">
+                  <a14:useLocalDpi xmlns:a14="http://schemas.microsoft.com/office/drawing/2010/main" val="0"/>
+                </a:ext>
+              </a:extLst>
+            </a:blip>
+            <a:stretch>
+              <a:fillRect/>
+            </a:stretch>
+          </p:blipFill>
+          <p:spPr>
+            <a:xfrm>
+              <a:off x="1634554" y="5064359"/>
+              <a:ext cx="981075" cy="742950"/>
+            </a:xfrm>
+            <a:prstGeom prst="rect">
+              <a:avLst/>
+            </a:prstGeom>
+          </p:spPr>
+        </p:pic>
+        <p:pic>
+          <p:nvPicPr>
+            <p:cNvPr id="92" name="Picture 91" descr="A person in a white shirt&#10;&#10;Description automatically generated">
+              <a:extLst>
+                <a:ext uri="{FF2B5EF4-FFF2-40B4-BE49-F238E27FC236}">
+                  <a16:creationId xmlns:a16="http://schemas.microsoft.com/office/drawing/2014/main" id="{FAE45D7F-C0EE-4ED3-8785-F23E1028D55A}"/>
+                </a:ext>
+              </a:extLst>
+            </p:cNvPr>
+            <p:cNvPicPr>
+              <a:picLocks noChangeAspect="1"/>
+            </p:cNvPicPr>
+            <p:nvPr/>
+          </p:nvPicPr>
+          <p:blipFill>
+            <a:blip r:embed="rId28">
+              <a:extLst>
+                <a:ext uri="{28A0092B-C50C-407E-A947-70E740481C1C}">
+                  <a14:useLocalDpi xmlns:a14="http://schemas.microsoft.com/office/drawing/2010/main" val="0"/>
+                </a:ext>
+              </a:extLst>
+            </a:blip>
+            <a:stretch>
+              <a:fillRect/>
+            </a:stretch>
+          </p:blipFill>
+          <p:spPr>
+            <a:xfrm>
+              <a:off x="2907863" y="5064359"/>
+              <a:ext cx="981075" cy="742950"/>
+            </a:xfrm>
+            <a:prstGeom prst="rect">
+              <a:avLst/>
+            </a:prstGeom>
+          </p:spPr>
+        </p:pic>
+        <p:pic>
+          <p:nvPicPr>
+            <p:cNvPr id="94" name="Picture 93" descr="A person in a white shirt&#10;&#10;Description automatically generated">
+              <a:extLst>
+                <a:ext uri="{FF2B5EF4-FFF2-40B4-BE49-F238E27FC236}">
+                  <a16:creationId xmlns:a16="http://schemas.microsoft.com/office/drawing/2014/main" id="{433D2E92-56DE-4D29-BFCF-D1DD9D6CDF5E}"/>
+                </a:ext>
+              </a:extLst>
+            </p:cNvPr>
+            <p:cNvPicPr>
+              <a:picLocks noChangeAspect="1"/>
+            </p:cNvPicPr>
+            <p:nvPr/>
+          </p:nvPicPr>
+          <p:blipFill>
+            <a:blip r:embed="rId29">
+              <a:extLst>
+                <a:ext uri="{28A0092B-C50C-407E-A947-70E740481C1C}">
+                  <a14:useLocalDpi xmlns:a14="http://schemas.microsoft.com/office/drawing/2010/main" val="0"/>
+                </a:ext>
+              </a:extLst>
+            </a:blip>
+            <a:stretch>
+              <a:fillRect/>
+            </a:stretch>
+          </p:blipFill>
+          <p:spPr>
+            <a:xfrm>
+              <a:off x="4181172" y="5064359"/>
+              <a:ext cx="981075" cy="742950"/>
+            </a:xfrm>
+            <a:prstGeom prst="rect">
+              <a:avLst/>
+            </a:prstGeom>
+          </p:spPr>
+        </p:pic>
+        <p:pic>
+          <p:nvPicPr>
+            <p:cNvPr id="96" name="Picture 95" descr="A person posing for the camera&#10;&#10;Description automatically generated">
+              <a:extLst>
+                <a:ext uri="{FF2B5EF4-FFF2-40B4-BE49-F238E27FC236}">
+                  <a16:creationId xmlns:a16="http://schemas.microsoft.com/office/drawing/2014/main" id="{5470C885-0450-4D7E-B6FC-35BFF7D857C4}"/>
+                </a:ext>
+              </a:extLst>
+            </p:cNvPr>
+            <p:cNvPicPr>
+              <a:picLocks noChangeAspect="1"/>
+            </p:cNvPicPr>
+            <p:nvPr/>
+          </p:nvPicPr>
+          <p:blipFill>
+            <a:blip r:embed="rId30">
+              <a:extLst>
+                <a:ext uri="{28A0092B-C50C-407E-A947-70E740481C1C}">
+                  <a14:useLocalDpi xmlns:a14="http://schemas.microsoft.com/office/drawing/2010/main" val="0"/>
+                </a:ext>
+              </a:extLst>
+            </a:blip>
+            <a:stretch>
+              <a:fillRect/>
+            </a:stretch>
+          </p:blipFill>
+          <p:spPr>
+            <a:xfrm>
+              <a:off x="5454481" y="5064359"/>
+              <a:ext cx="981075" cy="742950"/>
+            </a:xfrm>
+            <a:prstGeom prst="rect">
+              <a:avLst/>
+            </a:prstGeom>
+          </p:spPr>
+        </p:pic>
+        <p:pic>
+          <p:nvPicPr>
+            <p:cNvPr id="98" name="Picture 97" descr="A person in a white shirt&#10;&#10;Description automatically generated">
+              <a:extLst>
+                <a:ext uri="{FF2B5EF4-FFF2-40B4-BE49-F238E27FC236}">
+                  <a16:creationId xmlns:a16="http://schemas.microsoft.com/office/drawing/2014/main" id="{F7D88DDF-EE0E-4FC2-B813-A5F6FC776AC9}"/>
+                </a:ext>
+              </a:extLst>
+            </p:cNvPr>
+            <p:cNvPicPr>
+              <a:picLocks noChangeAspect="1"/>
+            </p:cNvPicPr>
+            <p:nvPr/>
+          </p:nvPicPr>
+          <p:blipFill>
+            <a:blip r:embed="rId31">
+              <a:extLst>
+                <a:ext uri="{28A0092B-C50C-407E-A947-70E740481C1C}">
+                  <a14:useLocalDpi xmlns:a14="http://schemas.microsoft.com/office/drawing/2010/main" val="0"/>
+                </a:ext>
+              </a:extLst>
+            </a:blip>
+            <a:stretch>
+              <a:fillRect/>
+            </a:stretch>
+          </p:blipFill>
+          <p:spPr>
+            <a:xfrm>
+              <a:off x="6727790" y="5064359"/>
+              <a:ext cx="981075" cy="742950"/>
+            </a:xfrm>
+            <a:prstGeom prst="rect">
+              <a:avLst/>
+            </a:prstGeom>
+          </p:spPr>
+        </p:pic>
+        <p:pic>
+          <p:nvPicPr>
+            <p:cNvPr id="100" name="Picture 99" descr="A person in a white shirt&#10;&#10;Description automatically generated">
+              <a:extLst>
+                <a:ext uri="{FF2B5EF4-FFF2-40B4-BE49-F238E27FC236}">
+                  <a16:creationId xmlns:a16="http://schemas.microsoft.com/office/drawing/2014/main" id="{A83D1FC6-ED20-4E30-9F11-5567ABD1DC6F}"/>
+                </a:ext>
+              </a:extLst>
+            </p:cNvPr>
+            <p:cNvPicPr>
+              <a:picLocks noChangeAspect="1"/>
+            </p:cNvPicPr>
+            <p:nvPr/>
+          </p:nvPicPr>
+          <p:blipFill>
+            <a:blip r:embed="rId32">
+              <a:extLst>
+                <a:ext uri="{28A0092B-C50C-407E-A947-70E740481C1C}">
+                  <a14:useLocalDpi xmlns:a14="http://schemas.microsoft.com/office/drawing/2010/main" val="0"/>
+                </a:ext>
+              </a:extLst>
+            </a:blip>
+            <a:stretch>
+              <a:fillRect/>
+            </a:stretch>
+          </p:blipFill>
+          <p:spPr>
+            <a:xfrm>
+              <a:off x="8001099" y="5064359"/>
+              <a:ext cx="981075" cy="742950"/>
+            </a:xfrm>
+            <a:prstGeom prst="rect">
+              <a:avLst/>
+            </a:prstGeom>
+          </p:spPr>
+        </p:pic>
+        <p:pic>
+          <p:nvPicPr>
+            <p:cNvPr id="102" name="Picture 101" descr="A person posing for the camera&#10;&#10;Description automatically generated">
+              <a:extLst>
+                <a:ext uri="{FF2B5EF4-FFF2-40B4-BE49-F238E27FC236}">
+                  <a16:creationId xmlns:a16="http://schemas.microsoft.com/office/drawing/2014/main" id="{54B8B8DC-D2DB-4388-83E6-E495AC306F36}"/>
+                </a:ext>
+              </a:extLst>
+            </p:cNvPr>
+            <p:cNvPicPr>
+              <a:picLocks noChangeAspect="1"/>
+            </p:cNvPicPr>
+            <p:nvPr/>
+          </p:nvPicPr>
+          <p:blipFill>
+            <a:blip r:embed="rId33">
+              <a:extLst>
+                <a:ext uri="{28A0092B-C50C-407E-A947-70E740481C1C}">
+                  <a14:useLocalDpi xmlns:a14="http://schemas.microsoft.com/office/drawing/2010/main" val="0"/>
+                </a:ext>
+              </a:extLst>
+            </a:blip>
+            <a:stretch>
+              <a:fillRect/>
+            </a:stretch>
+          </p:blipFill>
+          <p:spPr>
+            <a:xfrm>
+              <a:off x="9274408" y="5064359"/>
+              <a:ext cx="981075" cy="742950"/>
+            </a:xfrm>
+            <a:prstGeom prst="rect">
+              <a:avLst/>
+            </a:prstGeom>
+          </p:spPr>
+        </p:pic>
+        <p:pic>
+          <p:nvPicPr>
+            <p:cNvPr id="104" name="Picture 103" descr="A person posing for the camera&#10;&#10;Description automatically generated">
+              <a:extLst>
+                <a:ext uri="{FF2B5EF4-FFF2-40B4-BE49-F238E27FC236}">
+                  <a16:creationId xmlns:a16="http://schemas.microsoft.com/office/drawing/2014/main" id="{8B7088FE-3FCC-451F-8054-359E42F3A458}"/>
+                </a:ext>
+              </a:extLst>
+            </p:cNvPr>
+            <p:cNvPicPr>
+              <a:picLocks noChangeAspect="1"/>
+            </p:cNvPicPr>
+            <p:nvPr/>
+          </p:nvPicPr>
+          <p:blipFill>
+            <a:blip r:embed="rId34">
+              <a:extLst>
+                <a:ext uri="{28A0092B-C50C-407E-A947-70E740481C1C}">
+                  <a14:useLocalDpi xmlns:a14="http://schemas.microsoft.com/office/drawing/2010/main" val="0"/>
+                </a:ext>
+              </a:extLst>
+            </a:blip>
+            <a:stretch>
+              <a:fillRect/>
+            </a:stretch>
+          </p:blipFill>
+          <p:spPr>
+            <a:xfrm>
+              <a:off x="10547721" y="5064359"/>
+              <a:ext cx="981075" cy="742950"/>
+            </a:xfrm>
+            <a:prstGeom prst="rect">
+              <a:avLst/>
+            </a:prstGeom>
+          </p:spPr>
+        </p:pic>
+      </p:grpSp>
+    </p:spTree>
+    <p:extLst>
+      <p:ext uri="{BB962C8B-B14F-4D97-AF65-F5344CB8AC3E}">
+        <p14:creationId xmlns:p14="http://schemas.microsoft.com/office/powerpoint/2010/main" val="937586987"/>
+      </p:ext>
+    </p:extLst>
+  </p:cSld>
+  <p:clrMapOvr>
+    <a:masterClrMapping/>
+  </p:clrMapOvr>
+</p:sld>
+</file>
+
+<file path=ppt/slides/slide8.xml><?xml version="1.0" encoding="utf-8"?>
+<p:sld xmlns:a="http://schemas.openxmlformats.org/drawingml/2006/main" xmlns:r="http://schemas.openxmlformats.org/officeDocument/2006/relationships" xmlns:p="http://schemas.openxmlformats.org/presentationml/2006/main">
+  <p:cSld>
+    <p:spTree>
+      <p:nvGrpSpPr>
+        <p:cNvPr id="1" name=""/>
+        <p:cNvGrpSpPr/>
+        <p:nvPr/>
+      </p:nvGrpSpPr>
+      <p:grpSpPr>
+        <a:xfrm>
+          <a:off x="0" y="0"/>
+          <a:ext cx="0" cy="0"/>
+          <a:chOff x="0" y="0"/>
+          <a:chExt cx="0" cy="0"/>
+        </a:xfrm>
+      </p:grpSpPr>
+      <p:sp>
+        <p:nvSpPr>
+          <p:cNvPr id="4" name="Title 3">
+            <a:extLst>
+              <a:ext uri="{FF2B5EF4-FFF2-40B4-BE49-F238E27FC236}">
+                <a16:creationId xmlns:a16="http://schemas.microsoft.com/office/drawing/2014/main" id="{4714037B-6792-46D1-B1A3-8F9D22F05587}"/>
+              </a:ext>
+            </a:extLst>
+          </p:cNvPr>
+          <p:cNvSpPr>
+            <a:spLocks noGrp="1"/>
+          </p:cNvSpPr>
+          <p:nvPr>
+            <p:ph type="title"/>
+          </p:nvPr>
+        </p:nvSpPr>
+        <p:spPr/>
+        <p:txBody>
+          <a:bodyPr/>
+          <a:lstStyle/>
+          <a:p>
+            <a:r>
+              <a:rPr lang="en-US" dirty="0"/>
+              <a:t>“seek decimated” Sample</a:t>
+            </a:r>
+          </a:p>
+        </p:txBody>
+      </p:sp>
+      <p:sp>
+        <p:nvSpPr>
+          <p:cNvPr id="2" name="Footer Placeholder 1">
+            <a:extLst>
+              <a:ext uri="{FF2B5EF4-FFF2-40B4-BE49-F238E27FC236}">
+                <a16:creationId xmlns:a16="http://schemas.microsoft.com/office/drawing/2014/main" id="{6FCEFE30-5F1D-43F5-81E7-085E714B77C2}"/>
+              </a:ext>
+            </a:extLst>
+          </p:cNvPr>
+          <p:cNvSpPr>
+            <a:spLocks noGrp="1"/>
+          </p:cNvSpPr>
+          <p:nvPr>
+            <p:ph type="ftr" sz="quarter" idx="11"/>
+          </p:nvPr>
+        </p:nvSpPr>
+        <p:spPr/>
+        <p:txBody>
+          <a:bodyPr/>
+          <a:lstStyle/>
+          <a:p>
+            <a:r>
+              <a:rPr lang="en-US"/>
+              <a:t>Seek Thermal - Confidential Information</a:t>
+            </a:r>
+          </a:p>
+        </p:txBody>
+      </p:sp>
+      <p:sp>
+        <p:nvSpPr>
+          <p:cNvPr id="3" name="Slide Number Placeholder 2">
+            <a:extLst>
+              <a:ext uri="{FF2B5EF4-FFF2-40B4-BE49-F238E27FC236}">
+                <a16:creationId xmlns:a16="http://schemas.microsoft.com/office/drawing/2014/main" id="{0953B861-B0BD-416F-B271-AAEB8BB6B199}"/>
+              </a:ext>
+            </a:extLst>
+          </p:cNvPr>
+          <p:cNvSpPr>
+            <a:spLocks noGrp="1"/>
+          </p:cNvSpPr>
+          <p:nvPr>
+            <p:ph type="sldNum" sz="quarter" idx="12"/>
+          </p:nvPr>
+        </p:nvSpPr>
+        <p:spPr/>
+        <p:txBody>
+          <a:bodyPr/>
+          <a:lstStyle/>
+          <a:p>
+            <a:fld id="{727CC1CB-9F6E-4122-A134-B4A66D88A8C8}" type="slidenum">
+              <a:rPr lang="en-US" smtClean="0"/>
+              <a:pPr/>
+              <a:t>8</a:t>
+            </a:fld>
+            <a:endParaRPr lang="en-US"/>
+          </a:p>
+        </p:txBody>
+      </p:sp>
+      <p:sp>
+        <p:nvSpPr>
+          <p:cNvPr id="44" name="Content Placeholder 43">
+            <a:extLst>
+              <a:ext uri="{FF2B5EF4-FFF2-40B4-BE49-F238E27FC236}">
+                <a16:creationId xmlns:a16="http://schemas.microsoft.com/office/drawing/2014/main" id="{B94F2A1A-FB10-4EA5-B25C-5F85124C2123}"/>
+              </a:ext>
+            </a:extLst>
+          </p:cNvPr>
+          <p:cNvSpPr>
+            <a:spLocks noGrp="1"/>
+          </p:cNvSpPr>
+          <p:nvPr>
+            <p:ph idx="1"/>
+          </p:nvPr>
+        </p:nvSpPr>
+        <p:spPr/>
+        <p:txBody>
+          <a:bodyPr/>
+          <a:lstStyle/>
+          <a:p>
+            <a:r>
+              <a:rPr lang="en-US" dirty="0"/>
+              <a:t>2x Super Resolution</a:t>
+            </a:r>
+          </a:p>
+        </p:txBody>
+      </p:sp>
+      <p:grpSp>
+        <p:nvGrpSpPr>
+          <p:cNvPr id="14" name="Group 13">
+            <a:extLst>
+              <a:ext uri="{FF2B5EF4-FFF2-40B4-BE49-F238E27FC236}">
+                <a16:creationId xmlns:a16="http://schemas.microsoft.com/office/drawing/2014/main" id="{94F48FCD-8743-4B0D-A920-7BBEF50B5A26}"/>
+              </a:ext>
+            </a:extLst>
+          </p:cNvPr>
+          <p:cNvGrpSpPr/>
+          <p:nvPr/>
+        </p:nvGrpSpPr>
+        <p:grpSpPr>
+          <a:xfrm>
+            <a:off x="229048" y="2189548"/>
+            <a:ext cx="3790950" cy="3389494"/>
+            <a:chOff x="229048" y="1604761"/>
+            <a:chExt cx="3790950" cy="3389494"/>
+          </a:xfrm>
+        </p:grpSpPr>
+        <p:sp>
+          <p:nvSpPr>
+            <p:cNvPr id="46" name="TextBox 45">
+              <a:extLst>
+                <a:ext uri="{FF2B5EF4-FFF2-40B4-BE49-F238E27FC236}">
+                  <a16:creationId xmlns:a16="http://schemas.microsoft.com/office/drawing/2014/main" id="{1A92B6AA-4755-4285-9CC7-9A41216AD3D6}"/>
+                </a:ext>
+              </a:extLst>
+            </p:cNvPr>
+            <p:cNvSpPr txBox="1"/>
+            <p:nvPr/>
+          </p:nvSpPr>
+          <p:spPr>
+            <a:xfrm flipH="1">
+              <a:off x="266229" y="4532590"/>
+              <a:ext cx="3670616" cy="461665"/>
+            </a:xfrm>
+            <a:prstGeom prst="rect">
+              <a:avLst/>
+            </a:prstGeom>
+            <a:noFill/>
+          </p:spPr>
+          <p:txBody>
+            <a:bodyPr wrap="square" rtlCol="0">
+              <a:spAutoFit/>
+            </a:bodyPr>
+            <a:lstStyle/>
+            <a:p>
+              <a:pPr algn="ctr"/>
+              <a:r>
+                <a:rPr lang="en-US" sz="2400" dirty="0"/>
+                <a:t>Images 0-31</a:t>
+              </a:r>
+            </a:p>
+          </p:txBody>
+        </p:sp>
+        <p:pic>
+          <p:nvPicPr>
+            <p:cNvPr id="7" name="Picture 6" descr="A picture containing window, white, sitting, black&#10;&#10;Description automatically generated">
+              <a:extLst>
+                <a:ext uri="{FF2B5EF4-FFF2-40B4-BE49-F238E27FC236}">
+                  <a16:creationId xmlns:a16="http://schemas.microsoft.com/office/drawing/2014/main" id="{A3F34447-1E8F-40FD-BFB2-E1ACA520ABEF}"/>
+                </a:ext>
+              </a:extLst>
+            </p:cNvPr>
+            <p:cNvPicPr>
+              <a:picLocks noChangeAspect="1"/>
+            </p:cNvPicPr>
+            <p:nvPr/>
+          </p:nvPicPr>
+          <p:blipFill>
+            <a:blip r:embed="rId2">
+              <a:extLst>
+                <a:ext uri="{28A0092B-C50C-407E-A947-70E740481C1C}">
+                  <a14:useLocalDpi xmlns:a14="http://schemas.microsoft.com/office/drawing/2010/main" val="0"/>
+                </a:ext>
+              </a:extLst>
+            </a:blip>
+            <a:stretch>
+              <a:fillRect/>
+            </a:stretch>
+          </p:blipFill>
+          <p:spPr>
+            <a:xfrm>
+              <a:off x="229048" y="1604761"/>
+              <a:ext cx="3790950" cy="2838450"/>
+            </a:xfrm>
+            <a:prstGeom prst="rect">
+              <a:avLst/>
+            </a:prstGeom>
+          </p:spPr>
+        </p:pic>
+      </p:grpSp>
+      <p:grpSp>
+        <p:nvGrpSpPr>
+          <p:cNvPr id="15" name="Group 14">
+            <a:extLst>
+              <a:ext uri="{FF2B5EF4-FFF2-40B4-BE49-F238E27FC236}">
+                <a16:creationId xmlns:a16="http://schemas.microsoft.com/office/drawing/2014/main" id="{2C8E8E2A-3CE1-4F0B-853F-21877D321D91}"/>
+              </a:ext>
+            </a:extLst>
+          </p:cNvPr>
+          <p:cNvGrpSpPr/>
+          <p:nvPr/>
+        </p:nvGrpSpPr>
+        <p:grpSpPr>
+          <a:xfrm>
+            <a:off x="4200525" y="2189548"/>
+            <a:ext cx="3832526" cy="3389494"/>
+            <a:chOff x="4200525" y="1604761"/>
+            <a:chExt cx="3832526" cy="3389494"/>
+          </a:xfrm>
+        </p:grpSpPr>
+        <p:sp>
+          <p:nvSpPr>
+            <p:cNvPr id="48" name="TextBox 47">
+              <a:extLst>
+                <a:ext uri="{FF2B5EF4-FFF2-40B4-BE49-F238E27FC236}">
+                  <a16:creationId xmlns:a16="http://schemas.microsoft.com/office/drawing/2014/main" id="{F3675411-A53F-4ECC-AD51-AFCEAB73300D}"/>
+                </a:ext>
+              </a:extLst>
+            </p:cNvPr>
+            <p:cNvSpPr txBox="1"/>
+            <p:nvPr/>
+          </p:nvSpPr>
+          <p:spPr>
+            <a:xfrm flipH="1">
+              <a:off x="4200525" y="4532590"/>
+              <a:ext cx="3790950" cy="461665"/>
+            </a:xfrm>
+            <a:prstGeom prst="rect">
+              <a:avLst/>
+            </a:prstGeom>
+            <a:noFill/>
+          </p:spPr>
+          <p:txBody>
+            <a:bodyPr wrap="square" rtlCol="0">
+              <a:spAutoFit/>
+            </a:bodyPr>
+            <a:lstStyle/>
+            <a:p>
+              <a:pPr algn="ctr"/>
+              <a:r>
+                <a:rPr lang="en-US" sz="2400" dirty="0"/>
+                <a:t>Images 0-15</a:t>
+              </a:r>
+            </a:p>
+          </p:txBody>
+        </p:sp>
+        <p:pic>
+          <p:nvPicPr>
+            <p:cNvPr id="10" name="Picture 9" descr="A picture containing window, white, sitting, black&#10;&#10;Description automatically generated">
+              <a:extLst>
+                <a:ext uri="{FF2B5EF4-FFF2-40B4-BE49-F238E27FC236}">
+                  <a16:creationId xmlns:a16="http://schemas.microsoft.com/office/drawing/2014/main" id="{56F49EC4-7A22-4250-96CF-A2E2532F788C}"/>
+                </a:ext>
+              </a:extLst>
+            </p:cNvPr>
+            <p:cNvPicPr>
+              <a:picLocks noChangeAspect="1"/>
+            </p:cNvPicPr>
+            <p:nvPr/>
+          </p:nvPicPr>
+          <p:blipFill>
+            <a:blip r:embed="rId3">
+              <a:extLst>
+                <a:ext uri="{28A0092B-C50C-407E-A947-70E740481C1C}">
+                  <a14:useLocalDpi xmlns:a14="http://schemas.microsoft.com/office/drawing/2010/main" val="0"/>
+                </a:ext>
+              </a:extLst>
+            </a:blip>
+            <a:stretch>
+              <a:fillRect/>
+            </a:stretch>
+          </p:blipFill>
+          <p:spPr>
+            <a:xfrm>
+              <a:off x="4242101" y="1604761"/>
+              <a:ext cx="3790950" cy="2838450"/>
+            </a:xfrm>
+            <a:prstGeom prst="rect">
+              <a:avLst/>
+            </a:prstGeom>
+          </p:spPr>
+        </p:pic>
+      </p:grpSp>
+      <p:grpSp>
+        <p:nvGrpSpPr>
+          <p:cNvPr id="16" name="Group 15">
+            <a:extLst>
+              <a:ext uri="{FF2B5EF4-FFF2-40B4-BE49-F238E27FC236}">
+                <a16:creationId xmlns:a16="http://schemas.microsoft.com/office/drawing/2014/main" id="{6499831E-811F-42EB-80C5-F5F63A171F36}"/>
+              </a:ext>
+            </a:extLst>
+          </p:cNvPr>
+          <p:cNvGrpSpPr/>
+          <p:nvPr/>
+        </p:nvGrpSpPr>
+        <p:grpSpPr>
+          <a:xfrm>
+            <a:off x="8255154" y="2189548"/>
+            <a:ext cx="3790950" cy="3389494"/>
+            <a:chOff x="8255154" y="1604761"/>
+            <a:chExt cx="3790950" cy="3389494"/>
+          </a:xfrm>
+        </p:grpSpPr>
+        <p:sp>
+          <p:nvSpPr>
+            <p:cNvPr id="49" name="TextBox 48">
+              <a:extLst>
+                <a:ext uri="{FF2B5EF4-FFF2-40B4-BE49-F238E27FC236}">
+                  <a16:creationId xmlns:a16="http://schemas.microsoft.com/office/drawing/2014/main" id="{ED5165BB-DD52-49AC-BF4A-F4A09D02F71B}"/>
+                </a:ext>
+              </a:extLst>
+            </p:cNvPr>
+            <p:cNvSpPr txBox="1"/>
+            <p:nvPr/>
+          </p:nvSpPr>
+          <p:spPr>
+            <a:xfrm flipH="1">
+              <a:off x="8255154" y="4532590"/>
+              <a:ext cx="3790950" cy="461665"/>
+            </a:xfrm>
+            <a:prstGeom prst="rect">
+              <a:avLst/>
+            </a:prstGeom>
+            <a:noFill/>
+          </p:spPr>
+          <p:txBody>
+            <a:bodyPr wrap="square" rtlCol="0">
+              <a:spAutoFit/>
+            </a:bodyPr>
+            <a:lstStyle/>
+            <a:p>
+              <a:pPr algn="ctr"/>
+              <a:r>
+                <a:rPr lang="en-US" sz="2400" dirty="0"/>
+                <a:t>Images 16-31</a:t>
+              </a:r>
+            </a:p>
+          </p:txBody>
+        </p:sp>
+        <p:pic>
+          <p:nvPicPr>
+            <p:cNvPr id="13" name="Picture 12" descr="A picture containing window, white, sitting, black&#10;&#10;Description automatically generated">
+              <a:extLst>
+                <a:ext uri="{FF2B5EF4-FFF2-40B4-BE49-F238E27FC236}">
+                  <a16:creationId xmlns:a16="http://schemas.microsoft.com/office/drawing/2014/main" id="{C348A1DA-89F7-4AE0-8559-0FB1DD65CC23}"/>
+                </a:ext>
+              </a:extLst>
+            </p:cNvPr>
+            <p:cNvPicPr>
+              <a:picLocks noChangeAspect="1"/>
+            </p:cNvPicPr>
+            <p:nvPr/>
+          </p:nvPicPr>
+          <p:blipFill>
+            <a:blip r:embed="rId4">
+              <a:extLst>
+                <a:ext uri="{28A0092B-C50C-407E-A947-70E740481C1C}">
+                  <a14:useLocalDpi xmlns:a14="http://schemas.microsoft.com/office/drawing/2010/main" val="0"/>
+                </a:ext>
+              </a:extLst>
+            </a:blip>
+            <a:stretch>
+              <a:fillRect/>
+            </a:stretch>
+          </p:blipFill>
+          <p:spPr>
+            <a:xfrm>
+              <a:off x="8255154" y="1604761"/>
+              <a:ext cx="3790950" cy="2838450"/>
+            </a:xfrm>
+            <a:prstGeom prst="rect">
+              <a:avLst/>
+            </a:prstGeom>
+          </p:spPr>
+        </p:pic>
+      </p:grpSp>
+    </p:spTree>
+    <p:extLst>
+      <p:ext uri="{BB962C8B-B14F-4D97-AF65-F5344CB8AC3E}">
+        <p14:creationId xmlns:p14="http://schemas.microsoft.com/office/powerpoint/2010/main" val="1597113666"/>
       </p:ext>
     </p:extLst>
   </p:cSld>

</xml_diff>

<commit_message>
Update SuperRes.pptx Update run-seek-2x.bat
</commit_message>
<xml_diff>
--- a/doc/SuperRes.pptx
+++ b/doc/SuperRes.pptx
@@ -5,7 +5,7 @@
     <p:sldMasterId id="2147483751" r:id="rId1"/>
   </p:sldMasterIdLst>
   <p:handoutMasterIdLst>
-    <p:handoutMasterId r:id="rId10"/>
+    <p:handoutMasterId r:id="rId11"/>
   </p:handoutMasterIdLst>
   <p:sldIdLst>
     <p:sldId id="256" r:id="rId2"/>
@@ -16,6 +16,7 @@
     <p:sldId id="261" r:id="rId7"/>
     <p:sldId id="262" r:id="rId8"/>
     <p:sldId id="263" r:id="rId9"/>
+    <p:sldId id="264" r:id="rId10"/>
   </p:sldIdLst>
   <p:sldSz cx="12192000" cy="6858000"/>
   <p:notesSz cx="7772400" cy="10058400"/>
@@ -219,7 +220,7 @@
           <a:p>
             <a:fld id="{A8FEA5F6-C128-7D42-B852-EE0BD41289E6}" type="datetimeFigureOut">
               <a:rPr lang="en-US" smtClean="0"/>
-              <a:t>4/27/2020</a:t>
+              <a:t>4/28/2020</a:t>
             </a:fld>
             <a:endParaRPr lang="en-US"/>
           </a:p>
@@ -443,7 +444,7 @@
           <a:p>
             <a:fld id="{03C079E3-F3AF-45D0-80C9-F1EB5ACFF5C6}" type="datetime1">
               <a:rPr lang="en-US" smtClean="0"/>
-              <a:t>4/27/2020</a:t>
+              <a:t>4/28/2020</a:t>
             </a:fld>
             <a:endParaRPr lang="en-US"/>
           </a:p>
@@ -614,7 +615,7 @@
           <a:p>
             <a:fld id="{CC580D91-220E-4CA3-A5A8-D04CB5698DFE}" type="datetime1">
               <a:rPr lang="en-US" smtClean="0"/>
-              <a:t>4/27/2020</a:t>
+              <a:t>4/28/2020</a:t>
             </a:fld>
             <a:endParaRPr lang="en-US"/>
           </a:p>
@@ -795,7 +796,7 @@
           <a:p>
             <a:fld id="{BC5A4BEE-9B9B-44F9-804F-F2415DB37DB3}" type="datetime1">
               <a:rPr lang="en-US" smtClean="0"/>
-              <a:t>4/27/2020</a:t>
+              <a:t>4/28/2020</a:t>
             </a:fld>
             <a:endParaRPr lang="en-US"/>
           </a:p>
@@ -1305,7 +1306,7 @@
           <a:p>
             <a:fld id="{18F8BBFA-4311-4F0D-9EFA-A17F07365DE1}" type="datetime1">
               <a:rPr lang="en-US" smtClean="0"/>
-              <a:t>4/27/2020</a:t>
+              <a:t>4/28/2020</a:t>
             </a:fld>
             <a:endParaRPr lang="en-US"/>
           </a:p>
@@ -1644,7 +1645,7 @@
             <a:fld id="{CBFB9B72-5D09-4F82-BD9B-A3EC267EC6B2}" type="datetime1">
               <a:rPr lang="en-US" smtClean="0"/>
               <a:pPr/>
-              <a:t>4/27/2020</a:t>
+              <a:t>4/28/2020</a:t>
             </a:fld>
             <a:endParaRPr lang="en-US" dirty="0"/>
           </a:p>
@@ -1889,7 +1890,7 @@
           <a:p>
             <a:fld id="{ADAD34AE-F053-446E-9718-F3B6BF5290BC}" type="datetime1">
               <a:rPr lang="en-US" smtClean="0"/>
-              <a:t>4/27/2020</a:t>
+              <a:t>4/28/2020</a:t>
             </a:fld>
             <a:endParaRPr lang="en-US"/>
           </a:p>
@@ -2256,7 +2257,7 @@
           <a:p>
             <a:fld id="{FE7BB467-F74C-4B6E-A1B0-296B85EC07C0}" type="datetime1">
               <a:rPr lang="en-US" smtClean="0"/>
-              <a:t>4/27/2020</a:t>
+              <a:t>4/28/2020</a:t>
             </a:fld>
             <a:endParaRPr lang="en-US"/>
           </a:p>
@@ -2376,7 +2377,7 @@
           <a:p>
             <a:fld id="{9E7C8656-70E0-4BB2-86A7-DAADC775AECB}" type="datetime1">
               <a:rPr lang="en-US" smtClean="0"/>
-              <a:t>4/27/2020</a:t>
+              <a:t>4/28/2020</a:t>
             </a:fld>
             <a:endParaRPr lang="en-US"/>
           </a:p>
@@ -2474,7 +2475,7 @@
           <a:p>
             <a:fld id="{E2DFE557-B6FA-4EE9-9A24-EC76EA5D11A5}" type="datetime1">
               <a:rPr lang="en-US" smtClean="0"/>
-              <a:t>4/27/2020</a:t>
+              <a:t>4/28/2020</a:t>
             </a:fld>
             <a:endParaRPr lang="en-US"/>
           </a:p>
@@ -2752,7 +2753,7 @@
           <a:p>
             <a:fld id="{979A59E5-C72B-483A-973E-297CB30D810B}" type="datetime1">
               <a:rPr lang="en-US" smtClean="0"/>
-              <a:t>4/27/2020</a:t>
+              <a:t>4/28/2020</a:t>
             </a:fld>
             <a:endParaRPr lang="en-US"/>
           </a:p>
@@ -3010,7 +3011,7 @@
           <a:p>
             <a:fld id="{BC0D42AD-88D3-4D4A-AF19-2669679066E6}" type="datetime1">
               <a:rPr lang="en-US" smtClean="0"/>
-              <a:t>4/27/2020</a:t>
+              <a:t>4/28/2020</a:t>
             </a:fld>
             <a:endParaRPr lang="en-US"/>
           </a:p>
@@ -3225,7 +3226,7 @@
             <a:fld id="{CBFB9B72-5D09-4F82-BD9B-A3EC267EC6B2}" type="datetime1">
               <a:rPr lang="en-US" smtClean="0"/>
               <a:pPr/>
-              <a:t>4/27/2020</a:t>
+              <a:t>4/28/2020</a:t>
             </a:fld>
             <a:endParaRPr lang="en-US" dirty="0"/>
           </a:p>
@@ -8907,6 +8908,319 @@
     <p:extLst>
       <p:ext uri="{BB962C8B-B14F-4D97-AF65-F5344CB8AC3E}">
         <p14:creationId xmlns:p14="http://schemas.microsoft.com/office/powerpoint/2010/main" val="1597113666"/>
+      </p:ext>
+    </p:extLst>
+  </p:cSld>
+  <p:clrMapOvr>
+    <a:masterClrMapping/>
+  </p:clrMapOvr>
+</p:sld>
+</file>
+
+<file path=ppt/slides/slide9.xml><?xml version="1.0" encoding="utf-8"?>
+<p:sld xmlns:a="http://schemas.openxmlformats.org/drawingml/2006/main" xmlns:r="http://schemas.openxmlformats.org/officeDocument/2006/relationships" xmlns:p="http://schemas.openxmlformats.org/presentationml/2006/main">
+  <p:cSld>
+    <p:spTree>
+      <p:nvGrpSpPr>
+        <p:cNvPr id="1" name=""/>
+        <p:cNvGrpSpPr/>
+        <p:nvPr/>
+      </p:nvGrpSpPr>
+      <p:grpSpPr>
+        <a:xfrm>
+          <a:off x="0" y="0"/>
+          <a:ext cx="0" cy="0"/>
+          <a:chOff x="0" y="0"/>
+          <a:chExt cx="0" cy="0"/>
+        </a:xfrm>
+      </p:grpSpPr>
+      <p:sp>
+        <p:nvSpPr>
+          <p:cNvPr id="2" name="Title 1">
+            <a:extLst>
+              <a:ext uri="{FF2B5EF4-FFF2-40B4-BE49-F238E27FC236}">
+                <a16:creationId xmlns:a16="http://schemas.microsoft.com/office/drawing/2014/main" id="{479268FC-1E5D-4456-B460-B5B8E52FBC13}"/>
+              </a:ext>
+            </a:extLst>
+          </p:cNvPr>
+          <p:cNvSpPr>
+            <a:spLocks noGrp="1"/>
+          </p:cNvSpPr>
+          <p:nvPr>
+            <p:ph type="title"/>
+          </p:nvPr>
+        </p:nvSpPr>
+        <p:spPr/>
+        <p:txBody>
+          <a:bodyPr/>
+          <a:lstStyle/>
+          <a:p>
+            <a:r>
+              <a:rPr lang="en-US" dirty="0"/>
+              <a:t>8k vs 32k</a:t>
+            </a:r>
+          </a:p>
+        </p:txBody>
+      </p:sp>
+      <p:sp>
+        <p:nvSpPr>
+          <p:cNvPr id="3" name="Content Placeholder 2">
+            <a:extLst>
+              <a:ext uri="{FF2B5EF4-FFF2-40B4-BE49-F238E27FC236}">
+                <a16:creationId xmlns:a16="http://schemas.microsoft.com/office/drawing/2014/main" id="{FA55031A-698C-4B91-AB63-3576BC6E65C4}"/>
+              </a:ext>
+            </a:extLst>
+          </p:cNvPr>
+          <p:cNvSpPr>
+            <a:spLocks noGrp="1"/>
+          </p:cNvSpPr>
+          <p:nvPr>
+            <p:ph idx="1"/>
+          </p:nvPr>
+        </p:nvSpPr>
+        <p:spPr>
+          <a:xfrm>
+            <a:off x="295392" y="990247"/>
+            <a:ext cx="11442952" cy="5478287"/>
+          </a:xfrm>
+        </p:spPr>
+        <p:txBody>
+          <a:bodyPr/>
+          <a:lstStyle/>
+          <a:p>
+            <a:r>
+              <a:rPr lang="en-US" dirty="0"/>
+              <a:t>8k (300% size)</a:t>
+            </a:r>
+          </a:p>
+          <a:p>
+            <a:endParaRPr lang="en-US" dirty="0"/>
+          </a:p>
+          <a:p>
+            <a:endParaRPr lang="en-US" dirty="0"/>
+          </a:p>
+          <a:p>
+            <a:endParaRPr lang="en-US" dirty="0"/>
+          </a:p>
+          <a:p>
+            <a:pPr marL="0" indent="0">
+              <a:buNone/>
+            </a:pPr>
+            <a:endParaRPr lang="en-US" dirty="0"/>
+          </a:p>
+          <a:p>
+            <a:r>
+              <a:rPr lang="en-US" dirty="0"/>
+              <a:t>32k (150% size)</a:t>
+            </a:r>
+          </a:p>
+        </p:txBody>
+      </p:sp>
+      <p:sp>
+        <p:nvSpPr>
+          <p:cNvPr id="4" name="Footer Placeholder 3">
+            <a:extLst>
+              <a:ext uri="{FF2B5EF4-FFF2-40B4-BE49-F238E27FC236}">
+                <a16:creationId xmlns:a16="http://schemas.microsoft.com/office/drawing/2014/main" id="{FAF06DF6-98E1-4B66-BD36-934B4F272EBF}"/>
+              </a:ext>
+            </a:extLst>
+          </p:cNvPr>
+          <p:cNvSpPr>
+            <a:spLocks noGrp="1"/>
+          </p:cNvSpPr>
+          <p:nvPr>
+            <p:ph type="ftr" sz="quarter" idx="11"/>
+          </p:nvPr>
+        </p:nvSpPr>
+        <p:spPr/>
+        <p:txBody>
+          <a:bodyPr/>
+          <a:lstStyle/>
+          <a:p>
+            <a:r>
+              <a:rPr lang="en-US"/>
+              <a:t>Seek Thermal - Confidential Information</a:t>
+            </a:r>
+          </a:p>
+        </p:txBody>
+      </p:sp>
+      <p:sp>
+        <p:nvSpPr>
+          <p:cNvPr id="5" name="Slide Number Placeholder 4">
+            <a:extLst>
+              <a:ext uri="{FF2B5EF4-FFF2-40B4-BE49-F238E27FC236}">
+                <a16:creationId xmlns:a16="http://schemas.microsoft.com/office/drawing/2014/main" id="{436B8CD0-63DA-4AF9-98AB-D24729E56E4F}"/>
+              </a:ext>
+            </a:extLst>
+          </p:cNvPr>
+          <p:cNvSpPr>
+            <a:spLocks noGrp="1"/>
+          </p:cNvSpPr>
+          <p:nvPr>
+            <p:ph type="sldNum" sz="quarter" idx="12"/>
+          </p:nvPr>
+        </p:nvSpPr>
+        <p:spPr/>
+        <p:txBody>
+          <a:bodyPr/>
+          <a:lstStyle/>
+          <a:p>
+            <a:fld id="{727CC1CB-9F6E-4122-A134-B4A66D88A8C8}" type="slidenum">
+              <a:rPr lang="en-US" smtClean="0"/>
+              <a:t>9</a:t>
+            </a:fld>
+            <a:endParaRPr lang="en-US"/>
+          </a:p>
+        </p:txBody>
+      </p:sp>
+      <p:pic>
+        <p:nvPicPr>
+          <p:cNvPr id="8" name="Picture 7" descr="A person in a white shirt&#10;&#10;Description automatically generated">
+            <a:extLst>
+              <a:ext uri="{FF2B5EF4-FFF2-40B4-BE49-F238E27FC236}">
+                <a16:creationId xmlns:a16="http://schemas.microsoft.com/office/drawing/2014/main" id="{1FFDE2B7-9482-4ED3-B09B-872385D48CDB}"/>
+              </a:ext>
+            </a:extLst>
+          </p:cNvPr>
+          <p:cNvPicPr>
+            <a:picLocks noChangeAspect="1"/>
+          </p:cNvPicPr>
+          <p:nvPr/>
+        </p:nvPicPr>
+        <p:blipFill>
+          <a:blip r:embed="rId2">
+            <a:extLst>
+              <a:ext uri="{28A0092B-C50C-407E-A947-70E740481C1C}">
+                <a14:useLocalDpi xmlns:a14="http://schemas.microsoft.com/office/drawing/2010/main" val="0"/>
+              </a:ext>
+            </a:extLst>
+          </a:blip>
+          <a:stretch>
+            <a:fillRect/>
+          </a:stretch>
+        </p:blipFill>
+        <p:spPr>
+          <a:xfrm>
+            <a:off x="3152774" y="1033853"/>
+            <a:ext cx="2943225" cy="2228850"/>
+          </a:xfrm>
+          <a:prstGeom prst="rect">
+            <a:avLst/>
+          </a:prstGeom>
+        </p:spPr>
+      </p:pic>
+      <p:pic>
+        <p:nvPicPr>
+          <p:cNvPr id="10" name="Picture 9" descr="A person posing for the camera&#10;&#10;Description automatically generated">
+            <a:extLst>
+              <a:ext uri="{FF2B5EF4-FFF2-40B4-BE49-F238E27FC236}">
+                <a16:creationId xmlns:a16="http://schemas.microsoft.com/office/drawing/2014/main" id="{5B8DA0EA-2F6F-492D-9BFA-0D68D0642F1E}"/>
+              </a:ext>
+            </a:extLst>
+          </p:cNvPr>
+          <p:cNvPicPr>
+            <a:picLocks noChangeAspect="1"/>
+          </p:cNvPicPr>
+          <p:nvPr/>
+        </p:nvPicPr>
+        <p:blipFill>
+          <a:blip r:embed="rId3">
+            <a:extLst>
+              <a:ext uri="{28A0092B-C50C-407E-A947-70E740481C1C}">
+                <a14:useLocalDpi xmlns:a14="http://schemas.microsoft.com/office/drawing/2010/main" val="0"/>
+              </a:ext>
+            </a:extLst>
+          </a:blip>
+          <a:stretch>
+            <a:fillRect/>
+          </a:stretch>
+        </p:blipFill>
+        <p:spPr>
+          <a:xfrm>
+            <a:off x="6420293" y="1033852"/>
+            <a:ext cx="2943225" cy="2228850"/>
+          </a:xfrm>
+          <a:prstGeom prst="rect">
+            <a:avLst/>
+          </a:prstGeom>
+        </p:spPr>
+      </p:pic>
+      <p:pic>
+        <p:nvPicPr>
+          <p:cNvPr id="12" name="Picture 11" descr="A person wearing a white shirt&#10;&#10;Description automatically generated">
+            <a:extLst>
+              <a:ext uri="{FF2B5EF4-FFF2-40B4-BE49-F238E27FC236}">
+                <a16:creationId xmlns:a16="http://schemas.microsoft.com/office/drawing/2014/main" id="{88F9F01A-5EB4-4F3C-8EA8-23585660001D}"/>
+              </a:ext>
+            </a:extLst>
+          </p:cNvPr>
+          <p:cNvPicPr>
+            <a:picLocks noChangeAspect="1"/>
+          </p:cNvPicPr>
+          <p:nvPr/>
+        </p:nvPicPr>
+        <p:blipFill>
+          <a:blip r:embed="rId4">
+            <a:extLst>
+              <a:ext uri="{28A0092B-C50C-407E-A947-70E740481C1C}">
+                <a14:useLocalDpi xmlns:a14="http://schemas.microsoft.com/office/drawing/2010/main" val="0"/>
+              </a:ext>
+            </a:extLst>
+          </a:blip>
+          <a:stretch>
+            <a:fillRect/>
+          </a:stretch>
+        </p:blipFill>
+        <p:spPr>
+          <a:xfrm>
+            <a:off x="3152775" y="3600542"/>
+            <a:ext cx="2943225" cy="2228850"/>
+          </a:xfrm>
+          <a:prstGeom prst="rect">
+            <a:avLst/>
+          </a:prstGeom>
+        </p:spPr>
+      </p:pic>
+      <p:pic>
+        <p:nvPicPr>
+          <p:cNvPr id="14" name="Picture 13" descr="A person wearing a white shirt&#10;&#10;Description automatically generated">
+            <a:extLst>
+              <a:ext uri="{FF2B5EF4-FFF2-40B4-BE49-F238E27FC236}">
+                <a16:creationId xmlns:a16="http://schemas.microsoft.com/office/drawing/2014/main" id="{1D6913EC-DA83-436A-B968-86C01E91DD47}"/>
+              </a:ext>
+            </a:extLst>
+          </p:cNvPr>
+          <p:cNvPicPr>
+            <a:picLocks noChangeAspect="1"/>
+          </p:cNvPicPr>
+          <p:nvPr/>
+        </p:nvPicPr>
+        <p:blipFill>
+          <a:blip r:embed="rId5">
+            <a:extLst>
+              <a:ext uri="{28A0092B-C50C-407E-A947-70E740481C1C}">
+                <a14:useLocalDpi xmlns:a14="http://schemas.microsoft.com/office/drawing/2010/main" val="0"/>
+              </a:ext>
+            </a:extLst>
+          </a:blip>
+          <a:stretch>
+            <a:fillRect/>
+          </a:stretch>
+        </p:blipFill>
+        <p:spPr>
+          <a:xfrm>
+            <a:off x="6420292" y="3600542"/>
+            <a:ext cx="2943225" cy="2228850"/>
+          </a:xfrm>
+          <a:prstGeom prst="rect">
+            <a:avLst/>
+          </a:prstGeom>
+        </p:spPr>
+      </p:pic>
+    </p:spTree>
+    <p:extLst>
+      <p:ext uri="{BB962C8B-B14F-4D97-AF65-F5344CB8AC3E}">
+        <p14:creationId xmlns:p14="http://schemas.microsoft.com/office/powerpoint/2010/main" val="1755209394"/>
       </p:ext>
     </p:extLst>
   </p:cSld>

</xml_diff>